<commit_message>
final edits to ppt
</commit_message>
<xml_diff>
--- a/Presentation2.pptx
+++ b/Presentation2.pptx
@@ -10,12 +10,32 @@
     <p:sldId id="257" r:id="rId4"/>
     <p:sldId id="263" r:id="rId5"/>
     <p:sldId id="258" r:id="rId6"/>
-    <p:sldId id="259" r:id="rId7"/>
-    <p:sldId id="265" r:id="rId8"/>
-    <p:sldId id="264" r:id="rId9"/>
-    <p:sldId id="261" r:id="rId10"/>
-    <p:sldId id="266" r:id="rId11"/>
-    <p:sldId id="262" r:id="rId12"/>
+    <p:sldId id="272" r:id="rId7"/>
+    <p:sldId id="273" r:id="rId8"/>
+    <p:sldId id="259" r:id="rId9"/>
+    <p:sldId id="264" r:id="rId10"/>
+    <p:sldId id="292" r:id="rId11"/>
+    <p:sldId id="293" r:id="rId12"/>
+    <p:sldId id="294" r:id="rId13"/>
+    <p:sldId id="295" r:id="rId14"/>
+    <p:sldId id="274" r:id="rId15"/>
+    <p:sldId id="278" r:id="rId16"/>
+    <p:sldId id="276" r:id="rId17"/>
+    <p:sldId id="277" r:id="rId18"/>
+    <p:sldId id="279" r:id="rId19"/>
+    <p:sldId id="280" r:id="rId20"/>
+    <p:sldId id="281" r:id="rId21"/>
+    <p:sldId id="285" r:id="rId22"/>
+    <p:sldId id="284" r:id="rId23"/>
+    <p:sldId id="275" r:id="rId24"/>
+    <p:sldId id="283" r:id="rId25"/>
+    <p:sldId id="288" r:id="rId26"/>
+    <p:sldId id="287" r:id="rId27"/>
+    <p:sldId id="286" r:id="rId28"/>
+    <p:sldId id="282" r:id="rId29"/>
+    <p:sldId id="290" r:id="rId30"/>
+    <p:sldId id="289" r:id="rId31"/>
+    <p:sldId id="262" r:id="rId32"/>
   </p:sldIdLst>
   <p:sldSz cx="12192000" cy="6858000"/>
   <p:notesSz cx="6858000" cy="9144000"/>
@@ -2469,7 +2489,7 @@
           <a:p>
             <a:fld id="{3C04E684-10F4-4CC3-A0B9-F03AA7BE37CF}" type="datetimeFigureOut">
               <a:rPr lang="en-US" smtClean="0"/>
-              <a:t>3/5/23</a:t>
+              <a:t>3/9/23</a:t>
             </a:fld>
             <a:endParaRPr lang="en-US"/>
           </a:p>
@@ -4959,7 +4979,7 @@
           <a:p>
             <a:fld id="{3C04E684-10F4-4CC3-A0B9-F03AA7BE37CF}" type="datetimeFigureOut">
               <a:rPr lang="en-US" smtClean="0"/>
-              <a:t>3/5/23</a:t>
+              <a:t>3/9/23</a:t>
             </a:fld>
             <a:endParaRPr lang="en-US"/>
           </a:p>
@@ -5157,7 +5177,7 @@
           <a:p>
             <a:fld id="{3C04E684-10F4-4CC3-A0B9-F03AA7BE37CF}" type="datetimeFigureOut">
               <a:rPr lang="en-US" smtClean="0"/>
-              <a:t>3/5/23</a:t>
+              <a:t>3/9/23</a:t>
             </a:fld>
             <a:endParaRPr lang="en-US"/>
           </a:p>
@@ -5365,7 +5385,7 @@
           <a:p>
             <a:fld id="{3C04E684-10F4-4CC3-A0B9-F03AA7BE37CF}" type="datetimeFigureOut">
               <a:rPr lang="en-US" smtClean="0"/>
-              <a:t>3/5/23</a:t>
+              <a:t>3/9/23</a:t>
             </a:fld>
             <a:endParaRPr lang="en-US"/>
           </a:p>
@@ -5585,7 +5605,7 @@
           <a:p>
             <a:fld id="{3C04E684-10F4-4CC3-A0B9-F03AA7BE37CF}" type="datetimeFigureOut">
               <a:rPr lang="en-US" smtClean="0"/>
-              <a:t>3/5/23</a:t>
+              <a:t>3/9/23</a:t>
             </a:fld>
             <a:endParaRPr lang="en-US"/>
           </a:p>
@@ -5783,7 +5803,7 @@
           <a:p>
             <a:fld id="{3C04E684-10F4-4CC3-A0B9-F03AA7BE37CF}" type="datetimeFigureOut">
               <a:rPr lang="en-US" smtClean="0"/>
-              <a:t>3/5/23</a:t>
+              <a:t>3/9/23</a:t>
             </a:fld>
             <a:endParaRPr lang="en-US"/>
           </a:p>
@@ -6058,7 +6078,7 @@
           <a:p>
             <a:fld id="{3C04E684-10F4-4CC3-A0B9-F03AA7BE37CF}" type="datetimeFigureOut">
               <a:rPr lang="en-US" smtClean="0"/>
-              <a:t>3/5/23</a:t>
+              <a:t>3/9/23</a:t>
             </a:fld>
             <a:endParaRPr lang="en-US"/>
           </a:p>
@@ -6323,7 +6343,7 @@
           <a:p>
             <a:fld id="{3C04E684-10F4-4CC3-A0B9-F03AA7BE37CF}" type="datetimeFigureOut">
               <a:rPr lang="en-US" smtClean="0"/>
-              <a:t>3/5/23</a:t>
+              <a:t>3/9/23</a:t>
             </a:fld>
             <a:endParaRPr lang="en-US"/>
           </a:p>
@@ -6735,7 +6755,7 @@
           <a:p>
             <a:fld id="{3C04E684-10F4-4CC3-A0B9-F03AA7BE37CF}" type="datetimeFigureOut">
               <a:rPr lang="en-US" smtClean="0"/>
-              <a:t>3/5/23</a:t>
+              <a:t>3/9/23</a:t>
             </a:fld>
             <a:endParaRPr lang="en-US"/>
           </a:p>
@@ -6876,7 +6896,7 @@
           <a:p>
             <a:fld id="{3C04E684-10F4-4CC3-A0B9-F03AA7BE37CF}" type="datetimeFigureOut">
               <a:rPr lang="en-US" smtClean="0"/>
-              <a:t>3/5/23</a:t>
+              <a:t>3/9/23</a:t>
             </a:fld>
             <a:endParaRPr lang="en-US"/>
           </a:p>
@@ -6989,7 +7009,7 @@
           <a:p>
             <a:fld id="{3C04E684-10F4-4CC3-A0B9-F03AA7BE37CF}" type="datetimeFigureOut">
               <a:rPr lang="en-US" smtClean="0"/>
-              <a:t>3/5/23</a:t>
+              <a:t>3/9/23</a:t>
             </a:fld>
             <a:endParaRPr lang="en-US"/>
           </a:p>
@@ -7726,7 +7746,7 @@
           <a:p>
             <a:fld id="{3C04E684-10F4-4CC3-A0B9-F03AA7BE37CF}" type="datetimeFigureOut">
               <a:rPr lang="en-US" smtClean="0"/>
-              <a:t>3/5/23</a:t>
+              <a:t>3/9/23</a:t>
             </a:fld>
             <a:endParaRPr lang="en-US"/>
           </a:p>
@@ -8037,7 +8057,7 @@
           <a:p>
             <a:fld id="{3C04E684-10F4-4CC3-A0B9-F03AA7BE37CF}" type="datetimeFigureOut">
               <a:rPr lang="en-US" smtClean="0"/>
-              <a:t>3/5/23</a:t>
+              <a:t>3/9/23</a:t>
             </a:fld>
             <a:endParaRPr lang="en-US"/>
           </a:p>
@@ -8325,7 +8345,7 @@
           <a:p>
             <a:fld id="{3C04E684-10F4-4CC3-A0B9-F03AA7BE37CF}" type="datetimeFigureOut">
               <a:rPr lang="en-US" smtClean="0"/>
-              <a:t>3/5/23</a:t>
+              <a:t>3/9/23</a:t>
             </a:fld>
             <a:endParaRPr lang="en-US"/>
           </a:p>
@@ -8523,7 +8543,7 @@
           <a:p>
             <a:fld id="{3C04E684-10F4-4CC3-A0B9-F03AA7BE37CF}" type="datetimeFigureOut">
               <a:rPr lang="en-US" smtClean="0"/>
-              <a:t>3/5/23</a:t>
+              <a:t>3/9/23</a:t>
             </a:fld>
             <a:endParaRPr lang="en-US"/>
           </a:p>
@@ -8731,7 +8751,7 @@
           <a:p>
             <a:fld id="{3C04E684-10F4-4CC3-A0B9-F03AA7BE37CF}" type="datetimeFigureOut">
               <a:rPr lang="en-US" smtClean="0"/>
-              <a:t>3/5/23</a:t>
+              <a:t>3/9/23</a:t>
             </a:fld>
             <a:endParaRPr lang="en-US"/>
           </a:p>
@@ -9373,7 +9393,7 @@
           <a:p>
             <a:fld id="{3C04E684-10F4-4CC3-A0B9-F03AA7BE37CF}" type="datetimeFigureOut">
               <a:rPr lang="en-US" smtClean="0"/>
-              <a:t>3/5/23</a:t>
+              <a:t>3/9/23</a:t>
             </a:fld>
             <a:endParaRPr lang="en-US"/>
           </a:p>
@@ -10173,7 +10193,7 @@
           <a:p>
             <a:fld id="{3C04E684-10F4-4CC3-A0B9-F03AA7BE37CF}" type="datetimeFigureOut">
               <a:rPr lang="en-US" smtClean="0"/>
-              <a:t>3/5/23</a:t>
+              <a:t>3/9/23</a:t>
             </a:fld>
             <a:endParaRPr lang="en-US"/>
           </a:p>
@@ -11124,7 +11144,7 @@
           <a:p>
             <a:fld id="{3C04E684-10F4-4CC3-A0B9-F03AA7BE37CF}" type="datetimeFigureOut">
               <a:rPr lang="en-US" smtClean="0"/>
-              <a:t>3/5/23</a:t>
+              <a:t>3/9/23</a:t>
             </a:fld>
             <a:endParaRPr lang="en-US"/>
           </a:p>
@@ -13473,7 +13493,7 @@
           <a:p>
             <a:fld id="{3C04E684-10F4-4CC3-A0B9-F03AA7BE37CF}" type="datetimeFigureOut">
               <a:rPr lang="en-US" smtClean="0"/>
-              <a:t>3/5/23</a:t>
+              <a:t>3/9/23</a:t>
             </a:fld>
             <a:endParaRPr lang="en-US"/>
           </a:p>
@@ -13586,7 +13606,7 @@
           <a:p>
             <a:fld id="{3C04E684-10F4-4CC3-A0B9-F03AA7BE37CF}" type="datetimeFigureOut">
               <a:rPr lang="en-US" smtClean="0"/>
-              <a:t>3/5/23</a:t>
+              <a:t>3/9/23</a:t>
             </a:fld>
             <a:endParaRPr lang="en-US"/>
           </a:p>
@@ -14093,7 +14113,7 @@
           <a:p>
             <a:fld id="{3C04E684-10F4-4CC3-A0B9-F03AA7BE37CF}" type="datetimeFigureOut">
               <a:rPr lang="en-US" smtClean="0"/>
-              <a:t>3/5/23</a:t>
+              <a:t>3/9/23</a:t>
             </a:fld>
             <a:endParaRPr lang="en-US"/>
           </a:p>
@@ -15396,7 +15416,7 @@
           <a:p>
             <a:fld id="{3C04E684-10F4-4CC3-A0B9-F03AA7BE37CF}" type="datetimeFigureOut">
               <a:rPr lang="en-US" smtClean="0"/>
-              <a:t>3/5/23</a:t>
+              <a:t>3/9/23</a:t>
             </a:fld>
             <a:endParaRPr lang="en-US"/>
           </a:p>
@@ -15643,7 +15663,7 @@
           <a:p>
             <a:fld id="{3C04E684-10F4-4CC3-A0B9-F03AA7BE37CF}" type="datetimeFigureOut">
               <a:rPr lang="en-US" smtClean="0"/>
-              <a:t>3/5/23</a:t>
+              <a:t>3/9/23</a:t>
             </a:fld>
             <a:endParaRPr lang="en-US"/>
           </a:p>
@@ -16212,7 +16232,7 @@
           <a:p>
             <a:fld id="{3C04E684-10F4-4CC3-A0B9-F03AA7BE37CF}" type="datetimeFigureOut">
               <a:rPr lang="en-US" smtClean="0"/>
-              <a:t>3/5/23</a:t>
+              <a:t>3/9/23</a:t>
             </a:fld>
             <a:endParaRPr lang="en-US"/>
           </a:p>
@@ -17002,7 +17022,402 @@
           <a:p>
             <a:r>
               <a:rPr lang="en-US" dirty="0"/>
-              <a:t>Conclusions</a:t>
+              <a:t>Data and Methodology</a:t>
+            </a:r>
+          </a:p>
+        </p:txBody>
+      </p:sp>
+      <p:graphicFrame>
+        <p:nvGraphicFramePr>
+          <p:cNvPr id="10" name="Content Placeholder 8">
+            <a:extLst>
+              <a:ext uri="{FF2B5EF4-FFF2-40B4-BE49-F238E27FC236}">
+                <a16:creationId xmlns:a16="http://schemas.microsoft.com/office/drawing/2014/main" id="{74DB5C1A-44FC-56FC-684B-DBD797F2E000}"/>
+              </a:ext>
+            </a:extLst>
+          </p:cNvPr>
+          <p:cNvGraphicFramePr>
+            <a:graphicFrameLocks noChangeAspect="1"/>
+          </p:cNvGraphicFramePr>
+          <p:nvPr>
+            <p:extLst>
+              <p:ext uri="{D42A27DB-BD31-4B8C-83A1-F6EECF244321}">
+                <p14:modId xmlns:p14="http://schemas.microsoft.com/office/powerpoint/2010/main" val="1668084476"/>
+              </p:ext>
+            </p:extLst>
+          </p:nvPr>
+        </p:nvGraphicFramePr>
+        <p:xfrm>
+          <a:off x="477783" y="1805371"/>
+          <a:ext cx="13233400" cy="3822700"/>
+        </p:xfrm>
+        <a:graphic>
+          <a:graphicData uri="http://schemas.openxmlformats.org/presentationml/2006/ole">
+            <mc:AlternateContent xmlns:mc="http://schemas.openxmlformats.org/markup-compatibility/2006">
+              <mc:Choice xmlns:v="urn:schemas-microsoft-com:vml" Requires="v">
+                <p:oleObj name="Worksheet" r:id="rId2" imgW="13233400" imgH="3822700" progId="Excel.Sheet.12">
+                  <p:embed/>
+                </p:oleObj>
+              </mc:Choice>
+              <mc:Fallback>
+                <p:oleObj name="Worksheet" r:id="rId2" imgW="13233400" imgH="3822700" progId="Excel.Sheet.12">
+                  <p:embed/>
+                  <p:pic>
+                    <p:nvPicPr>
+                      <p:cNvPr id="9" name="Content Placeholder 8">
+                        <a:extLst>
+                          <a:ext uri="{FF2B5EF4-FFF2-40B4-BE49-F238E27FC236}">
+                            <a16:creationId xmlns:a16="http://schemas.microsoft.com/office/drawing/2014/main" id="{54170F99-A79C-96A9-098E-6FDAB7685BB4}"/>
+                          </a:ext>
+                        </a:extLst>
+                      </p:cNvPr>
+                      <p:cNvPicPr/>
+                      <p:nvPr/>
+                    </p:nvPicPr>
+                    <p:blipFill>
+                      <a:blip r:embed="rId3"/>
+                      <a:stretch>
+                        <a:fillRect/>
+                      </a:stretch>
+                    </p:blipFill>
+                    <p:spPr>
+                      <a:xfrm>
+                        <a:off x="477783" y="1805371"/>
+                        <a:ext cx="13233400" cy="3822700"/>
+                      </a:xfrm>
+                      <a:prstGeom prst="rect">
+                        <a:avLst/>
+                      </a:prstGeom>
+                    </p:spPr>
+                  </p:pic>
+                </p:oleObj>
+              </mc:Fallback>
+            </mc:AlternateContent>
+          </a:graphicData>
+        </a:graphic>
+      </p:graphicFrame>
+    </p:spTree>
+    <p:extLst>
+      <p:ext uri="{BB962C8B-B14F-4D97-AF65-F5344CB8AC3E}">
+        <p14:creationId xmlns:p14="http://schemas.microsoft.com/office/powerpoint/2010/main" val="661874928"/>
+      </p:ext>
+    </p:extLst>
+  </p:cSld>
+  <p:clrMapOvr>
+    <a:masterClrMapping/>
+  </p:clrMapOvr>
+</p:sld>
+</file>
+
+<file path=ppt/slides/slide11.xml><?xml version="1.0" encoding="utf-8"?>
+<p:sld xmlns:a="http://schemas.openxmlformats.org/drawingml/2006/main" xmlns:r="http://schemas.openxmlformats.org/officeDocument/2006/relationships" xmlns:p="http://schemas.openxmlformats.org/presentationml/2006/main">
+  <p:cSld>
+    <p:bg>
+      <p:bgPr>
+        <a:solidFill>
+          <a:srgbClr val="D2B48C"/>
+        </a:solidFill>
+        <a:effectLst/>
+      </p:bgPr>
+    </p:bg>
+    <p:spTree>
+      <p:nvGrpSpPr>
+        <p:cNvPr id="1" name=""/>
+        <p:cNvGrpSpPr/>
+        <p:nvPr/>
+      </p:nvGrpSpPr>
+      <p:grpSpPr>
+        <a:xfrm>
+          <a:off x="0" y="0"/>
+          <a:ext cx="0" cy="0"/>
+          <a:chOff x="0" y="0"/>
+          <a:chExt cx="0" cy="0"/>
+        </a:xfrm>
+      </p:grpSpPr>
+      <p:sp>
+        <p:nvSpPr>
+          <p:cNvPr id="2" name="Title 1">
+            <a:extLst>
+              <a:ext uri="{FF2B5EF4-FFF2-40B4-BE49-F238E27FC236}">
+                <a16:creationId xmlns:a16="http://schemas.microsoft.com/office/drawing/2014/main" id="{D9197732-5287-64EE-B5C3-31790AED66D7}"/>
+              </a:ext>
+            </a:extLst>
+          </p:cNvPr>
+          <p:cNvSpPr>
+            <a:spLocks noGrp="1"/>
+          </p:cNvSpPr>
+          <p:nvPr>
+            <p:ph type="title"/>
+          </p:nvPr>
+        </p:nvSpPr>
+        <p:spPr/>
+        <p:txBody>
+          <a:bodyPr/>
+          <a:lstStyle/>
+          <a:p>
+            <a:r>
+              <a:rPr lang="en-US" dirty="0"/>
+              <a:t>Data and Methodology</a:t>
+            </a:r>
+          </a:p>
+        </p:txBody>
+      </p:sp>
+      <p:graphicFrame>
+        <p:nvGraphicFramePr>
+          <p:cNvPr id="3" name="Content Placeholder 2">
+            <a:extLst>
+              <a:ext uri="{FF2B5EF4-FFF2-40B4-BE49-F238E27FC236}">
+                <a16:creationId xmlns:a16="http://schemas.microsoft.com/office/drawing/2014/main" id="{043ADAE8-826E-385B-2B93-AE7F6EB85971}"/>
+              </a:ext>
+            </a:extLst>
+          </p:cNvPr>
+          <p:cNvGraphicFramePr>
+            <a:graphicFrameLocks noGrp="1" noChangeAspect="1"/>
+          </p:cNvGraphicFramePr>
+          <p:nvPr>
+            <p:ph idx="1"/>
+            <p:extLst>
+              <p:ext uri="{D42A27DB-BD31-4B8C-83A1-F6EECF244321}">
+                <p14:modId xmlns:p14="http://schemas.microsoft.com/office/powerpoint/2010/main" val="471703098"/>
+              </p:ext>
+            </p:extLst>
+          </p:nvPr>
+        </p:nvGraphicFramePr>
+        <p:xfrm>
+          <a:off x="241300" y="2089150"/>
+          <a:ext cx="11709400" cy="3822700"/>
+        </p:xfrm>
+        <a:graphic>
+          <a:graphicData uri="http://schemas.openxmlformats.org/presentationml/2006/ole">
+            <mc:AlternateContent xmlns:mc="http://schemas.openxmlformats.org/markup-compatibility/2006">
+              <mc:Choice xmlns:v="urn:schemas-microsoft-com:vml" Requires="v">
+                <p:oleObj name="Worksheet" r:id="rId2" imgW="11709400" imgH="3822700" progId="Excel.Sheet.12">
+                  <p:embed/>
+                </p:oleObj>
+              </mc:Choice>
+              <mc:Fallback>
+                <p:oleObj name="Worksheet" r:id="rId2" imgW="11709400" imgH="3822700" progId="Excel.Sheet.12">
+                  <p:embed/>
+                  <p:pic>
+                    <p:nvPicPr>
+                      <p:cNvPr id="0" name=""/>
+                      <p:cNvPicPr/>
+                      <p:nvPr/>
+                    </p:nvPicPr>
+                    <p:blipFill>
+                      <a:blip r:embed="rId3"/>
+                      <a:stretch>
+                        <a:fillRect/>
+                      </a:stretch>
+                    </p:blipFill>
+                    <p:spPr>
+                      <a:xfrm>
+                        <a:off x="241300" y="2089150"/>
+                        <a:ext cx="11709400" cy="3822700"/>
+                      </a:xfrm>
+                      <a:prstGeom prst="rect">
+                        <a:avLst/>
+                      </a:prstGeom>
+                    </p:spPr>
+                  </p:pic>
+                </p:oleObj>
+              </mc:Fallback>
+            </mc:AlternateContent>
+          </a:graphicData>
+        </a:graphic>
+      </p:graphicFrame>
+    </p:spTree>
+    <p:extLst>
+      <p:ext uri="{BB962C8B-B14F-4D97-AF65-F5344CB8AC3E}">
+        <p14:creationId xmlns:p14="http://schemas.microsoft.com/office/powerpoint/2010/main" val="743853476"/>
+      </p:ext>
+    </p:extLst>
+  </p:cSld>
+  <p:clrMapOvr>
+    <a:masterClrMapping/>
+  </p:clrMapOvr>
+</p:sld>
+</file>
+
+<file path=ppt/slides/slide12.xml><?xml version="1.0" encoding="utf-8"?>
+<p:sld xmlns:a="http://schemas.openxmlformats.org/drawingml/2006/main" xmlns:r="http://schemas.openxmlformats.org/officeDocument/2006/relationships" xmlns:p="http://schemas.openxmlformats.org/presentationml/2006/main">
+  <p:cSld>
+    <p:bg>
+      <p:bgPr>
+        <a:solidFill>
+          <a:srgbClr val="D2B48C"/>
+        </a:solidFill>
+        <a:effectLst/>
+      </p:bgPr>
+    </p:bg>
+    <p:spTree>
+      <p:nvGrpSpPr>
+        <p:cNvPr id="1" name=""/>
+        <p:cNvGrpSpPr/>
+        <p:nvPr/>
+      </p:nvGrpSpPr>
+      <p:grpSpPr>
+        <a:xfrm>
+          <a:off x="0" y="0"/>
+          <a:ext cx="0" cy="0"/>
+          <a:chOff x="0" y="0"/>
+          <a:chExt cx="0" cy="0"/>
+        </a:xfrm>
+      </p:grpSpPr>
+      <p:sp>
+        <p:nvSpPr>
+          <p:cNvPr id="2" name="Title 1">
+            <a:extLst>
+              <a:ext uri="{FF2B5EF4-FFF2-40B4-BE49-F238E27FC236}">
+                <a16:creationId xmlns:a16="http://schemas.microsoft.com/office/drawing/2014/main" id="{D9197732-5287-64EE-B5C3-31790AED66D7}"/>
+              </a:ext>
+            </a:extLst>
+          </p:cNvPr>
+          <p:cNvSpPr>
+            <a:spLocks noGrp="1"/>
+          </p:cNvSpPr>
+          <p:nvPr>
+            <p:ph type="title"/>
+          </p:nvPr>
+        </p:nvSpPr>
+        <p:spPr/>
+        <p:txBody>
+          <a:bodyPr/>
+          <a:lstStyle/>
+          <a:p>
+            <a:r>
+              <a:rPr lang="en-US" dirty="0"/>
+              <a:t>Data and Methodology</a:t>
+            </a:r>
+          </a:p>
+        </p:txBody>
+      </p:sp>
+      <p:graphicFrame>
+        <p:nvGraphicFramePr>
+          <p:cNvPr id="3" name="Content Placeholder 2">
+            <a:extLst>
+              <a:ext uri="{FF2B5EF4-FFF2-40B4-BE49-F238E27FC236}">
+                <a16:creationId xmlns:a16="http://schemas.microsoft.com/office/drawing/2014/main" id="{6A3FE02E-6D60-285F-8778-200A6FBB6371}"/>
+              </a:ext>
+            </a:extLst>
+          </p:cNvPr>
+          <p:cNvGraphicFramePr>
+            <a:graphicFrameLocks noGrp="1" noChangeAspect="1"/>
+          </p:cNvGraphicFramePr>
+          <p:nvPr>
+            <p:ph idx="1"/>
+            <p:extLst>
+              <p:ext uri="{D42A27DB-BD31-4B8C-83A1-F6EECF244321}">
+                <p14:modId xmlns:p14="http://schemas.microsoft.com/office/powerpoint/2010/main" val="1374305336"/>
+              </p:ext>
+            </p:extLst>
+          </p:nvPr>
+        </p:nvGraphicFramePr>
+        <p:xfrm>
+          <a:off x="781050" y="2089150"/>
+          <a:ext cx="10629900" cy="3822700"/>
+        </p:xfrm>
+        <a:graphic>
+          <a:graphicData uri="http://schemas.openxmlformats.org/presentationml/2006/ole">
+            <mc:AlternateContent xmlns:mc="http://schemas.openxmlformats.org/markup-compatibility/2006">
+              <mc:Choice xmlns:v="urn:schemas-microsoft-com:vml" Requires="v">
+                <p:oleObj name="Worksheet" r:id="rId2" imgW="10629900" imgH="3822700" progId="Excel.Sheet.12">
+                  <p:embed/>
+                </p:oleObj>
+              </mc:Choice>
+              <mc:Fallback>
+                <p:oleObj name="Worksheet" r:id="rId2" imgW="10629900" imgH="3822700" progId="Excel.Sheet.12">
+                  <p:embed/>
+                  <p:pic>
+                    <p:nvPicPr>
+                      <p:cNvPr id="0" name=""/>
+                      <p:cNvPicPr/>
+                      <p:nvPr/>
+                    </p:nvPicPr>
+                    <p:blipFill>
+                      <a:blip r:embed="rId3"/>
+                      <a:stretch>
+                        <a:fillRect/>
+                      </a:stretch>
+                    </p:blipFill>
+                    <p:spPr>
+                      <a:xfrm>
+                        <a:off x="781050" y="2089150"/>
+                        <a:ext cx="10629900" cy="3822700"/>
+                      </a:xfrm>
+                      <a:prstGeom prst="rect">
+                        <a:avLst/>
+                      </a:prstGeom>
+                    </p:spPr>
+                  </p:pic>
+                </p:oleObj>
+              </mc:Fallback>
+            </mc:AlternateContent>
+          </a:graphicData>
+        </a:graphic>
+      </p:graphicFrame>
+    </p:spTree>
+    <p:extLst>
+      <p:ext uri="{BB962C8B-B14F-4D97-AF65-F5344CB8AC3E}">
+        <p14:creationId xmlns:p14="http://schemas.microsoft.com/office/powerpoint/2010/main" val="1282530100"/>
+      </p:ext>
+    </p:extLst>
+  </p:cSld>
+  <p:clrMapOvr>
+    <a:masterClrMapping/>
+  </p:clrMapOvr>
+</p:sld>
+</file>
+
+<file path=ppt/slides/slide13.xml><?xml version="1.0" encoding="utf-8"?>
+<p:sld xmlns:a="http://schemas.openxmlformats.org/drawingml/2006/main" xmlns:r="http://schemas.openxmlformats.org/officeDocument/2006/relationships" xmlns:p="http://schemas.openxmlformats.org/presentationml/2006/main">
+  <p:cSld>
+    <p:bg>
+      <p:bgPr>
+        <a:solidFill>
+          <a:srgbClr val="D2B48C"/>
+        </a:solidFill>
+        <a:effectLst/>
+      </p:bgPr>
+    </p:bg>
+    <p:spTree>
+      <p:nvGrpSpPr>
+        <p:cNvPr id="1" name=""/>
+        <p:cNvGrpSpPr/>
+        <p:nvPr/>
+      </p:nvGrpSpPr>
+      <p:grpSpPr>
+        <a:xfrm>
+          <a:off x="0" y="0"/>
+          <a:ext cx="0" cy="0"/>
+          <a:chOff x="0" y="0"/>
+          <a:chExt cx="0" cy="0"/>
+        </a:xfrm>
+      </p:grpSpPr>
+      <p:sp>
+        <p:nvSpPr>
+          <p:cNvPr id="2" name="Title 1">
+            <a:extLst>
+              <a:ext uri="{FF2B5EF4-FFF2-40B4-BE49-F238E27FC236}">
+                <a16:creationId xmlns:a16="http://schemas.microsoft.com/office/drawing/2014/main" id="{D9197732-5287-64EE-B5C3-31790AED66D7}"/>
+              </a:ext>
+            </a:extLst>
+          </p:cNvPr>
+          <p:cNvSpPr>
+            <a:spLocks noGrp="1"/>
+          </p:cNvSpPr>
+          <p:nvPr>
+            <p:ph type="title"/>
+          </p:nvPr>
+        </p:nvSpPr>
+        <p:spPr/>
+        <p:txBody>
+          <a:bodyPr/>
+          <a:lstStyle/>
+          <a:p>
+            <a:r>
+              <a:rPr lang="en-US" dirty="0"/>
+              <a:t>Results/Analysis</a:t>
             </a:r>
           </a:p>
         </p:txBody>
@@ -17031,25 +17446,620 @@
           <a:lstStyle/>
           <a:p>
             <a:r>
-              <a:rPr lang="en-US" sz="2400" b="0" i="0" u="none" strike="noStrike" dirty="0">
-                <a:solidFill>
-                  <a:srgbClr val="202020"/>
-                </a:solidFill>
-                <a:effectLst/>
+              <a:rPr lang="en-US" sz="2400" dirty="0">
                 <a:latin typeface="Corbel" panose="020B0503020204020204" pitchFamily="34" charset="0"/>
               </a:rPr>
-              <a:t>In conclusion, we found a trend in rural birds for dominants to outperform subordinates in a lever-pulling task, which may be explained by adults outperforming younger birds. Moreover, we found that rural birds were slightly more persistent in the paper-ripping task compared to birds from urbanized areas. Individual performance and persistence were not repeatable across tasks, and the traits defining the most innovative and persistent individuals in each task were not consistent, pointing to the need for experimental assessments on the effect of task characteristics on the repeatability of problem-solving performance and persistence. Overall, our findings suggest that different individual and ecological characteristics may facilitate innovative behavior in different ecological contexts.</a:t>
-            </a:r>
-            <a:endParaRPr lang="en-US" sz="2400" dirty="0">
-              <a:latin typeface="Corbel" panose="020B0503020204020204" pitchFamily="34" charset="0"/>
-            </a:endParaRPr>
+              <a:t>Lever task:</a:t>
+            </a:r>
+          </a:p>
+          <a:p>
+            <a:r>
+              <a:rPr lang="en-US" sz="2400" dirty="0">
+                <a:latin typeface="Corbel" panose="020B0503020204020204" pitchFamily="34" charset="0"/>
+              </a:rPr>
+              <a:t>50% of the birds completed the task in about 1300 seconds (or 21 min)</a:t>
+            </a:r>
+          </a:p>
+          <a:p>
+            <a:r>
+              <a:rPr lang="en-US" sz="2400" dirty="0">
+                <a:latin typeface="Corbel" panose="020B0503020204020204" pitchFamily="34" charset="0"/>
+              </a:rPr>
+              <a:t>The adults outperformed the juveniles</a:t>
+            </a:r>
+          </a:p>
+          <a:p>
+            <a:r>
+              <a:rPr lang="en-US" sz="2400" dirty="0">
+                <a:latin typeface="Corbel" panose="020B0503020204020204" pitchFamily="34" charset="0"/>
+              </a:rPr>
+              <a:t>The more dominant birds outperformed than the less dominant </a:t>
+            </a:r>
+          </a:p>
+          <a:p>
+            <a:r>
+              <a:rPr lang="en-US" sz="2400" dirty="0">
+                <a:latin typeface="Corbel" panose="020B0503020204020204" pitchFamily="34" charset="0"/>
+              </a:rPr>
+              <a:t>38 out of 65 birds solved the lever problem</a:t>
+            </a:r>
           </a:p>
         </p:txBody>
       </p:sp>
     </p:spTree>
     <p:extLst>
       <p:ext uri="{BB962C8B-B14F-4D97-AF65-F5344CB8AC3E}">
-        <p14:creationId xmlns:p14="http://schemas.microsoft.com/office/powerpoint/2010/main" val="217900715"/>
+        <p14:creationId xmlns:p14="http://schemas.microsoft.com/office/powerpoint/2010/main" val="2450800376"/>
+      </p:ext>
+    </p:extLst>
+  </p:cSld>
+  <p:clrMapOvr>
+    <a:masterClrMapping/>
+  </p:clrMapOvr>
+</p:sld>
+</file>
+
+<file path=ppt/slides/slide14.xml><?xml version="1.0" encoding="utf-8"?>
+<p:sld xmlns:a="http://schemas.openxmlformats.org/drawingml/2006/main" xmlns:r="http://schemas.openxmlformats.org/officeDocument/2006/relationships" xmlns:p="http://schemas.openxmlformats.org/presentationml/2006/main">
+  <p:cSld>
+    <p:bg>
+      <p:bgPr>
+        <a:solidFill>
+          <a:srgbClr val="D2B48C"/>
+        </a:solidFill>
+        <a:effectLst/>
+      </p:bgPr>
+    </p:bg>
+    <p:spTree>
+      <p:nvGrpSpPr>
+        <p:cNvPr id="1" name=""/>
+        <p:cNvGrpSpPr/>
+        <p:nvPr/>
+      </p:nvGrpSpPr>
+      <p:grpSpPr>
+        <a:xfrm>
+          <a:off x="0" y="0"/>
+          <a:ext cx="0" cy="0"/>
+          <a:chOff x="0" y="0"/>
+          <a:chExt cx="0" cy="0"/>
+        </a:xfrm>
+      </p:grpSpPr>
+      <p:sp>
+        <p:nvSpPr>
+          <p:cNvPr id="2" name="Title 1">
+            <a:extLst>
+              <a:ext uri="{FF2B5EF4-FFF2-40B4-BE49-F238E27FC236}">
+                <a16:creationId xmlns:a16="http://schemas.microsoft.com/office/drawing/2014/main" id="{D9197732-5287-64EE-B5C3-31790AED66D7}"/>
+              </a:ext>
+            </a:extLst>
+          </p:cNvPr>
+          <p:cNvSpPr>
+            <a:spLocks noGrp="1"/>
+          </p:cNvSpPr>
+          <p:nvPr>
+            <p:ph type="title"/>
+          </p:nvPr>
+        </p:nvSpPr>
+        <p:spPr/>
+        <p:txBody>
+          <a:bodyPr/>
+          <a:lstStyle/>
+          <a:p>
+            <a:r>
+              <a:rPr lang="en-US" dirty="0"/>
+              <a:t>Results/Analysis</a:t>
+            </a:r>
+          </a:p>
+        </p:txBody>
+      </p:sp>
+      <p:pic>
+        <p:nvPicPr>
+          <p:cNvPr id="6" name="Content Placeholder 5">
+            <a:extLst>
+              <a:ext uri="{FF2B5EF4-FFF2-40B4-BE49-F238E27FC236}">
+                <a16:creationId xmlns:a16="http://schemas.microsoft.com/office/drawing/2014/main" id="{6DAD47A0-6312-C410-6FE4-4F58F61F4F2D}"/>
+              </a:ext>
+            </a:extLst>
+          </p:cNvPr>
+          <p:cNvPicPr>
+            <a:picLocks noGrp="1" noChangeAspect="1"/>
+          </p:cNvPicPr>
+          <p:nvPr>
+            <p:ph idx="1"/>
+          </p:nvPr>
+        </p:nvPicPr>
+        <p:blipFill>
+          <a:blip r:embed="rId2"/>
+          <a:stretch>
+            <a:fillRect/>
+          </a:stretch>
+        </p:blipFill>
+        <p:spPr>
+          <a:xfrm>
+            <a:off x="2322786" y="1690688"/>
+            <a:ext cx="7546428" cy="5030952"/>
+          </a:xfrm>
+        </p:spPr>
+      </p:pic>
+    </p:spTree>
+    <p:extLst>
+      <p:ext uri="{BB962C8B-B14F-4D97-AF65-F5344CB8AC3E}">
+        <p14:creationId xmlns:p14="http://schemas.microsoft.com/office/powerpoint/2010/main" val="2117420315"/>
+      </p:ext>
+    </p:extLst>
+  </p:cSld>
+  <p:clrMapOvr>
+    <a:masterClrMapping/>
+  </p:clrMapOvr>
+</p:sld>
+</file>
+
+<file path=ppt/slides/slide15.xml><?xml version="1.0" encoding="utf-8"?>
+<p:sld xmlns:a="http://schemas.openxmlformats.org/drawingml/2006/main" xmlns:r="http://schemas.openxmlformats.org/officeDocument/2006/relationships" xmlns:p="http://schemas.openxmlformats.org/presentationml/2006/main">
+  <p:cSld>
+    <p:bg>
+      <p:bgPr>
+        <a:solidFill>
+          <a:srgbClr val="D2B48C"/>
+        </a:solidFill>
+        <a:effectLst/>
+      </p:bgPr>
+    </p:bg>
+    <p:spTree>
+      <p:nvGrpSpPr>
+        <p:cNvPr id="1" name=""/>
+        <p:cNvGrpSpPr/>
+        <p:nvPr/>
+      </p:nvGrpSpPr>
+      <p:grpSpPr>
+        <a:xfrm>
+          <a:off x="0" y="0"/>
+          <a:ext cx="0" cy="0"/>
+          <a:chOff x="0" y="0"/>
+          <a:chExt cx="0" cy="0"/>
+        </a:xfrm>
+      </p:grpSpPr>
+      <p:sp>
+        <p:nvSpPr>
+          <p:cNvPr id="2" name="Title 1">
+            <a:extLst>
+              <a:ext uri="{FF2B5EF4-FFF2-40B4-BE49-F238E27FC236}">
+                <a16:creationId xmlns:a16="http://schemas.microsoft.com/office/drawing/2014/main" id="{D9197732-5287-64EE-B5C3-31790AED66D7}"/>
+              </a:ext>
+            </a:extLst>
+          </p:cNvPr>
+          <p:cNvSpPr>
+            <a:spLocks noGrp="1"/>
+          </p:cNvSpPr>
+          <p:nvPr>
+            <p:ph type="title"/>
+          </p:nvPr>
+        </p:nvSpPr>
+        <p:spPr/>
+        <p:txBody>
+          <a:bodyPr/>
+          <a:lstStyle/>
+          <a:p>
+            <a:r>
+              <a:rPr lang="en-US" dirty="0"/>
+              <a:t>Results/Analysis</a:t>
+            </a:r>
+          </a:p>
+        </p:txBody>
+      </p:sp>
+      <p:pic>
+        <p:nvPicPr>
+          <p:cNvPr id="6" name="Content Placeholder 5">
+            <a:extLst>
+              <a:ext uri="{FF2B5EF4-FFF2-40B4-BE49-F238E27FC236}">
+                <a16:creationId xmlns:a16="http://schemas.microsoft.com/office/drawing/2014/main" id="{089A3C13-5A42-C216-6579-B56A34923166}"/>
+              </a:ext>
+            </a:extLst>
+          </p:cNvPr>
+          <p:cNvPicPr>
+            <a:picLocks noGrp="1" noChangeAspect="1"/>
+          </p:cNvPicPr>
+          <p:nvPr>
+            <p:ph idx="1"/>
+          </p:nvPr>
+        </p:nvPicPr>
+        <p:blipFill>
+          <a:blip r:embed="rId2"/>
+          <a:stretch>
+            <a:fillRect/>
+          </a:stretch>
+        </p:blipFill>
+        <p:spPr>
+          <a:xfrm>
+            <a:off x="2426494" y="1600200"/>
+            <a:ext cx="7339012" cy="4892675"/>
+          </a:xfrm>
+        </p:spPr>
+      </p:pic>
+    </p:spTree>
+    <p:extLst>
+      <p:ext uri="{BB962C8B-B14F-4D97-AF65-F5344CB8AC3E}">
+        <p14:creationId xmlns:p14="http://schemas.microsoft.com/office/powerpoint/2010/main" val="3000283682"/>
+      </p:ext>
+    </p:extLst>
+  </p:cSld>
+  <p:clrMapOvr>
+    <a:masterClrMapping/>
+  </p:clrMapOvr>
+</p:sld>
+</file>
+
+<file path=ppt/slides/slide16.xml><?xml version="1.0" encoding="utf-8"?>
+<p:sld xmlns:a="http://schemas.openxmlformats.org/drawingml/2006/main" xmlns:r="http://schemas.openxmlformats.org/officeDocument/2006/relationships" xmlns:p="http://schemas.openxmlformats.org/presentationml/2006/main">
+  <p:cSld>
+    <p:bg>
+      <p:bgPr>
+        <a:solidFill>
+          <a:srgbClr val="D2B48C"/>
+        </a:solidFill>
+        <a:effectLst/>
+      </p:bgPr>
+    </p:bg>
+    <p:spTree>
+      <p:nvGrpSpPr>
+        <p:cNvPr id="1" name=""/>
+        <p:cNvGrpSpPr/>
+        <p:nvPr/>
+      </p:nvGrpSpPr>
+      <p:grpSpPr>
+        <a:xfrm>
+          <a:off x="0" y="0"/>
+          <a:ext cx="0" cy="0"/>
+          <a:chOff x="0" y="0"/>
+          <a:chExt cx="0" cy="0"/>
+        </a:xfrm>
+      </p:grpSpPr>
+      <p:sp>
+        <p:nvSpPr>
+          <p:cNvPr id="2" name="Title 1">
+            <a:extLst>
+              <a:ext uri="{FF2B5EF4-FFF2-40B4-BE49-F238E27FC236}">
+                <a16:creationId xmlns:a16="http://schemas.microsoft.com/office/drawing/2014/main" id="{D9197732-5287-64EE-B5C3-31790AED66D7}"/>
+              </a:ext>
+            </a:extLst>
+          </p:cNvPr>
+          <p:cNvSpPr>
+            <a:spLocks noGrp="1"/>
+          </p:cNvSpPr>
+          <p:nvPr>
+            <p:ph type="title"/>
+          </p:nvPr>
+        </p:nvSpPr>
+        <p:spPr/>
+        <p:txBody>
+          <a:bodyPr/>
+          <a:lstStyle/>
+          <a:p>
+            <a:r>
+              <a:rPr lang="en-US" dirty="0"/>
+              <a:t>Results/Analysis</a:t>
+            </a:r>
+          </a:p>
+        </p:txBody>
+      </p:sp>
+      <p:pic>
+        <p:nvPicPr>
+          <p:cNvPr id="7" name="Content Placeholder 6">
+            <a:extLst>
+              <a:ext uri="{FF2B5EF4-FFF2-40B4-BE49-F238E27FC236}">
+                <a16:creationId xmlns:a16="http://schemas.microsoft.com/office/drawing/2014/main" id="{FED8A3F4-1F4D-2FD2-C28D-7AB533A4382F}"/>
+              </a:ext>
+            </a:extLst>
+          </p:cNvPr>
+          <p:cNvPicPr>
+            <a:picLocks noGrp="1" noChangeAspect="1"/>
+          </p:cNvPicPr>
+          <p:nvPr>
+            <p:ph idx="1"/>
+          </p:nvPr>
+        </p:nvPicPr>
+        <p:blipFill>
+          <a:blip r:embed="rId2"/>
+          <a:stretch>
+            <a:fillRect/>
+          </a:stretch>
+        </p:blipFill>
+        <p:spPr>
+          <a:xfrm>
+            <a:off x="2183606" y="1419225"/>
+            <a:ext cx="7824787" cy="5216525"/>
+          </a:xfrm>
+        </p:spPr>
+      </p:pic>
+    </p:spTree>
+    <p:extLst>
+      <p:ext uri="{BB962C8B-B14F-4D97-AF65-F5344CB8AC3E}">
+        <p14:creationId xmlns:p14="http://schemas.microsoft.com/office/powerpoint/2010/main" val="3574931176"/>
+      </p:ext>
+    </p:extLst>
+  </p:cSld>
+  <p:clrMapOvr>
+    <a:masterClrMapping/>
+  </p:clrMapOvr>
+</p:sld>
+</file>
+
+<file path=ppt/slides/slide17.xml><?xml version="1.0" encoding="utf-8"?>
+<p:sld xmlns:a="http://schemas.openxmlformats.org/drawingml/2006/main" xmlns:r="http://schemas.openxmlformats.org/officeDocument/2006/relationships" xmlns:p="http://schemas.openxmlformats.org/presentationml/2006/main">
+  <p:cSld>
+    <p:bg>
+      <p:bgPr>
+        <a:solidFill>
+          <a:srgbClr val="D2B48C"/>
+        </a:solidFill>
+        <a:effectLst/>
+      </p:bgPr>
+    </p:bg>
+    <p:spTree>
+      <p:nvGrpSpPr>
+        <p:cNvPr id="1" name=""/>
+        <p:cNvGrpSpPr/>
+        <p:nvPr/>
+      </p:nvGrpSpPr>
+      <p:grpSpPr>
+        <a:xfrm>
+          <a:off x="0" y="0"/>
+          <a:ext cx="0" cy="0"/>
+          <a:chOff x="0" y="0"/>
+          <a:chExt cx="0" cy="0"/>
+        </a:xfrm>
+      </p:grpSpPr>
+      <p:sp>
+        <p:nvSpPr>
+          <p:cNvPr id="2" name="Title 1">
+            <a:extLst>
+              <a:ext uri="{FF2B5EF4-FFF2-40B4-BE49-F238E27FC236}">
+                <a16:creationId xmlns:a16="http://schemas.microsoft.com/office/drawing/2014/main" id="{D9197732-5287-64EE-B5C3-31790AED66D7}"/>
+              </a:ext>
+            </a:extLst>
+          </p:cNvPr>
+          <p:cNvSpPr>
+            <a:spLocks noGrp="1"/>
+          </p:cNvSpPr>
+          <p:nvPr>
+            <p:ph type="title"/>
+          </p:nvPr>
+        </p:nvSpPr>
+        <p:spPr/>
+        <p:txBody>
+          <a:bodyPr/>
+          <a:lstStyle/>
+          <a:p>
+            <a:r>
+              <a:rPr lang="en-US" dirty="0"/>
+              <a:t>Results/Analysis</a:t>
+            </a:r>
+          </a:p>
+        </p:txBody>
+      </p:sp>
+      <p:pic>
+        <p:nvPicPr>
+          <p:cNvPr id="5" name="Content Placeholder 4">
+            <a:extLst>
+              <a:ext uri="{FF2B5EF4-FFF2-40B4-BE49-F238E27FC236}">
+                <a16:creationId xmlns:a16="http://schemas.microsoft.com/office/drawing/2014/main" id="{1AE03309-D798-D7D8-4240-AD9AF9F1DDAC}"/>
+              </a:ext>
+            </a:extLst>
+          </p:cNvPr>
+          <p:cNvPicPr>
+            <a:picLocks noGrp="1" noChangeAspect="1"/>
+          </p:cNvPicPr>
+          <p:nvPr>
+            <p:ph idx="1"/>
+          </p:nvPr>
+        </p:nvPicPr>
+        <p:blipFill>
+          <a:blip r:embed="rId2"/>
+          <a:stretch>
+            <a:fillRect/>
+          </a:stretch>
+        </p:blipFill>
+        <p:spPr>
+          <a:xfrm>
+            <a:off x="2190750" y="1494631"/>
+            <a:ext cx="7810500" cy="5207000"/>
+          </a:xfrm>
+        </p:spPr>
+      </p:pic>
+    </p:spTree>
+    <p:extLst>
+      <p:ext uri="{BB962C8B-B14F-4D97-AF65-F5344CB8AC3E}">
+        <p14:creationId xmlns:p14="http://schemas.microsoft.com/office/powerpoint/2010/main" val="1645709451"/>
+      </p:ext>
+    </p:extLst>
+  </p:cSld>
+  <p:clrMapOvr>
+    <a:masterClrMapping/>
+  </p:clrMapOvr>
+</p:sld>
+</file>
+
+<file path=ppt/slides/slide18.xml><?xml version="1.0" encoding="utf-8"?>
+<p:sld xmlns:a="http://schemas.openxmlformats.org/drawingml/2006/main" xmlns:r="http://schemas.openxmlformats.org/officeDocument/2006/relationships" xmlns:p="http://schemas.openxmlformats.org/presentationml/2006/main">
+  <p:cSld>
+    <p:bg>
+      <p:bgPr>
+        <a:solidFill>
+          <a:srgbClr val="D2B48C"/>
+        </a:solidFill>
+        <a:effectLst/>
+      </p:bgPr>
+    </p:bg>
+    <p:spTree>
+      <p:nvGrpSpPr>
+        <p:cNvPr id="1" name=""/>
+        <p:cNvGrpSpPr/>
+        <p:nvPr/>
+      </p:nvGrpSpPr>
+      <p:grpSpPr>
+        <a:xfrm>
+          <a:off x="0" y="0"/>
+          <a:ext cx="0" cy="0"/>
+          <a:chOff x="0" y="0"/>
+          <a:chExt cx="0" cy="0"/>
+        </a:xfrm>
+      </p:grpSpPr>
+      <p:sp>
+        <p:nvSpPr>
+          <p:cNvPr id="2" name="Title 1">
+            <a:extLst>
+              <a:ext uri="{FF2B5EF4-FFF2-40B4-BE49-F238E27FC236}">
+                <a16:creationId xmlns:a16="http://schemas.microsoft.com/office/drawing/2014/main" id="{D9197732-5287-64EE-B5C3-31790AED66D7}"/>
+              </a:ext>
+            </a:extLst>
+          </p:cNvPr>
+          <p:cNvSpPr>
+            <a:spLocks noGrp="1"/>
+          </p:cNvSpPr>
+          <p:nvPr>
+            <p:ph type="title"/>
+          </p:nvPr>
+        </p:nvSpPr>
+        <p:spPr/>
+        <p:txBody>
+          <a:bodyPr/>
+          <a:lstStyle/>
+          <a:p>
+            <a:r>
+              <a:rPr lang="en-US" dirty="0"/>
+              <a:t>Results/Analysis</a:t>
+            </a:r>
+          </a:p>
+        </p:txBody>
+      </p:sp>
+      <p:pic>
+        <p:nvPicPr>
+          <p:cNvPr id="5" name="Content Placeholder 4">
+            <a:extLst>
+              <a:ext uri="{FF2B5EF4-FFF2-40B4-BE49-F238E27FC236}">
+                <a16:creationId xmlns:a16="http://schemas.microsoft.com/office/drawing/2014/main" id="{C0DFB554-E29C-EAA2-A16A-7647B0A6BD11}"/>
+              </a:ext>
+            </a:extLst>
+          </p:cNvPr>
+          <p:cNvPicPr>
+            <a:picLocks noGrp="1" noChangeAspect="1"/>
+          </p:cNvPicPr>
+          <p:nvPr>
+            <p:ph idx="1"/>
+          </p:nvPr>
+        </p:nvPicPr>
+        <p:blipFill>
+          <a:blip r:embed="rId2"/>
+          <a:stretch>
+            <a:fillRect/>
+          </a:stretch>
+        </p:blipFill>
+        <p:spPr>
+          <a:xfrm>
+            <a:off x="2033587" y="1270794"/>
+            <a:ext cx="8124825" cy="5416550"/>
+          </a:xfrm>
+        </p:spPr>
+      </p:pic>
+    </p:spTree>
+    <p:extLst>
+      <p:ext uri="{BB962C8B-B14F-4D97-AF65-F5344CB8AC3E}">
+        <p14:creationId xmlns:p14="http://schemas.microsoft.com/office/powerpoint/2010/main" val="1157617952"/>
+      </p:ext>
+    </p:extLst>
+  </p:cSld>
+  <p:clrMapOvr>
+    <a:masterClrMapping/>
+  </p:clrMapOvr>
+</p:sld>
+</file>
+
+<file path=ppt/slides/slide19.xml><?xml version="1.0" encoding="utf-8"?>
+<p:sld xmlns:a="http://schemas.openxmlformats.org/drawingml/2006/main" xmlns:r="http://schemas.openxmlformats.org/officeDocument/2006/relationships" xmlns:p="http://schemas.openxmlformats.org/presentationml/2006/main">
+  <p:cSld>
+    <p:bg>
+      <p:bgPr>
+        <a:solidFill>
+          <a:srgbClr val="D2B48C"/>
+        </a:solidFill>
+        <a:effectLst/>
+      </p:bgPr>
+    </p:bg>
+    <p:spTree>
+      <p:nvGrpSpPr>
+        <p:cNvPr id="1" name=""/>
+        <p:cNvGrpSpPr/>
+        <p:nvPr/>
+      </p:nvGrpSpPr>
+      <p:grpSpPr>
+        <a:xfrm>
+          <a:off x="0" y="0"/>
+          <a:ext cx="0" cy="0"/>
+          <a:chOff x="0" y="0"/>
+          <a:chExt cx="0" cy="0"/>
+        </a:xfrm>
+      </p:grpSpPr>
+      <p:sp>
+        <p:nvSpPr>
+          <p:cNvPr id="2" name="Title 1">
+            <a:extLst>
+              <a:ext uri="{FF2B5EF4-FFF2-40B4-BE49-F238E27FC236}">
+                <a16:creationId xmlns:a16="http://schemas.microsoft.com/office/drawing/2014/main" id="{D9197732-5287-64EE-B5C3-31790AED66D7}"/>
+              </a:ext>
+            </a:extLst>
+          </p:cNvPr>
+          <p:cNvSpPr>
+            <a:spLocks noGrp="1"/>
+          </p:cNvSpPr>
+          <p:nvPr>
+            <p:ph type="title"/>
+          </p:nvPr>
+        </p:nvSpPr>
+        <p:spPr/>
+        <p:txBody>
+          <a:bodyPr/>
+          <a:lstStyle/>
+          <a:p>
+            <a:r>
+              <a:rPr lang="en-US" dirty="0"/>
+              <a:t>Results/Analysis</a:t>
+            </a:r>
+          </a:p>
+        </p:txBody>
+      </p:sp>
+      <p:pic>
+        <p:nvPicPr>
+          <p:cNvPr id="5" name="Content Placeholder 4">
+            <a:extLst>
+              <a:ext uri="{FF2B5EF4-FFF2-40B4-BE49-F238E27FC236}">
+                <a16:creationId xmlns:a16="http://schemas.microsoft.com/office/drawing/2014/main" id="{2D727450-1045-EF22-17F2-C208A3B1E5DD}"/>
+              </a:ext>
+            </a:extLst>
+          </p:cNvPr>
+          <p:cNvPicPr>
+            <a:picLocks noGrp="1" noChangeAspect="1"/>
+          </p:cNvPicPr>
+          <p:nvPr>
+            <p:ph idx="1"/>
+          </p:nvPr>
+        </p:nvPicPr>
+        <p:blipFill>
+          <a:blip r:embed="rId2"/>
+          <a:stretch>
+            <a:fillRect/>
+          </a:stretch>
+        </p:blipFill>
+        <p:spPr>
+          <a:xfrm>
+            <a:off x="2247900" y="1362075"/>
+            <a:ext cx="7696200" cy="5130800"/>
+          </a:xfrm>
+        </p:spPr>
+      </p:pic>
+    </p:spTree>
+    <p:extLst>
+      <p:ext uri="{BB962C8B-B14F-4D97-AF65-F5344CB8AC3E}">
+        <p14:creationId xmlns:p14="http://schemas.microsoft.com/office/powerpoint/2010/main" val="4192273908"/>
       </p:ext>
     </p:extLst>
   </p:cSld>
@@ -17201,6 +18211,1015 @@
 </p:sld>
 </file>
 
+<file path=ppt/slides/slide20.xml><?xml version="1.0" encoding="utf-8"?>
+<p:sld xmlns:a="http://schemas.openxmlformats.org/drawingml/2006/main" xmlns:r="http://schemas.openxmlformats.org/officeDocument/2006/relationships" xmlns:p="http://schemas.openxmlformats.org/presentationml/2006/main">
+  <p:cSld>
+    <p:bg>
+      <p:bgPr>
+        <a:solidFill>
+          <a:srgbClr val="D2B48C"/>
+        </a:solidFill>
+        <a:effectLst/>
+      </p:bgPr>
+    </p:bg>
+    <p:spTree>
+      <p:nvGrpSpPr>
+        <p:cNvPr id="1" name=""/>
+        <p:cNvGrpSpPr/>
+        <p:nvPr/>
+      </p:nvGrpSpPr>
+      <p:grpSpPr>
+        <a:xfrm>
+          <a:off x="0" y="0"/>
+          <a:ext cx="0" cy="0"/>
+          <a:chOff x="0" y="0"/>
+          <a:chExt cx="0" cy="0"/>
+        </a:xfrm>
+      </p:grpSpPr>
+      <p:sp>
+        <p:nvSpPr>
+          <p:cNvPr id="2" name="Title 1">
+            <a:extLst>
+              <a:ext uri="{FF2B5EF4-FFF2-40B4-BE49-F238E27FC236}">
+                <a16:creationId xmlns:a16="http://schemas.microsoft.com/office/drawing/2014/main" id="{D9197732-5287-64EE-B5C3-31790AED66D7}"/>
+              </a:ext>
+            </a:extLst>
+          </p:cNvPr>
+          <p:cNvSpPr>
+            <a:spLocks noGrp="1"/>
+          </p:cNvSpPr>
+          <p:nvPr>
+            <p:ph type="title"/>
+          </p:nvPr>
+        </p:nvSpPr>
+        <p:spPr/>
+        <p:txBody>
+          <a:bodyPr/>
+          <a:lstStyle/>
+          <a:p>
+            <a:r>
+              <a:rPr lang="en-US" dirty="0"/>
+              <a:t>Results/Analysis</a:t>
+            </a:r>
+          </a:p>
+        </p:txBody>
+      </p:sp>
+      <p:pic>
+        <p:nvPicPr>
+          <p:cNvPr id="5" name="Content Placeholder 4">
+            <a:extLst>
+              <a:ext uri="{FF2B5EF4-FFF2-40B4-BE49-F238E27FC236}">
+                <a16:creationId xmlns:a16="http://schemas.microsoft.com/office/drawing/2014/main" id="{1BC4EBAD-12A6-D7F1-AA34-668EDC257E7B}"/>
+              </a:ext>
+            </a:extLst>
+          </p:cNvPr>
+          <p:cNvPicPr>
+            <a:picLocks noGrp="1" noChangeAspect="1"/>
+          </p:cNvPicPr>
+          <p:nvPr>
+            <p:ph idx="1"/>
+          </p:nvPr>
+        </p:nvPicPr>
+        <p:blipFill>
+          <a:blip r:embed="rId2"/>
+          <a:stretch>
+            <a:fillRect/>
+          </a:stretch>
+        </p:blipFill>
+        <p:spPr>
+          <a:xfrm>
+            <a:off x="2519098" y="1340247"/>
+            <a:ext cx="7153804" cy="5365353"/>
+          </a:xfrm>
+        </p:spPr>
+      </p:pic>
+    </p:spTree>
+    <p:extLst>
+      <p:ext uri="{BB962C8B-B14F-4D97-AF65-F5344CB8AC3E}">
+        <p14:creationId xmlns:p14="http://schemas.microsoft.com/office/powerpoint/2010/main" val="1326240580"/>
+      </p:ext>
+    </p:extLst>
+  </p:cSld>
+  <p:clrMapOvr>
+    <a:masterClrMapping/>
+  </p:clrMapOvr>
+</p:sld>
+</file>
+
+<file path=ppt/slides/slide21.xml><?xml version="1.0" encoding="utf-8"?>
+<p:sld xmlns:a="http://schemas.openxmlformats.org/drawingml/2006/main" xmlns:r="http://schemas.openxmlformats.org/officeDocument/2006/relationships" xmlns:p="http://schemas.openxmlformats.org/presentationml/2006/main">
+  <p:cSld>
+    <p:bg>
+      <p:bgPr>
+        <a:solidFill>
+          <a:srgbClr val="D2B48C"/>
+        </a:solidFill>
+        <a:effectLst/>
+      </p:bgPr>
+    </p:bg>
+    <p:spTree>
+      <p:nvGrpSpPr>
+        <p:cNvPr id="1" name=""/>
+        <p:cNvGrpSpPr/>
+        <p:nvPr/>
+      </p:nvGrpSpPr>
+      <p:grpSpPr>
+        <a:xfrm>
+          <a:off x="0" y="0"/>
+          <a:ext cx="0" cy="0"/>
+          <a:chOff x="0" y="0"/>
+          <a:chExt cx="0" cy="0"/>
+        </a:xfrm>
+      </p:grpSpPr>
+      <p:sp>
+        <p:nvSpPr>
+          <p:cNvPr id="2" name="Title 1">
+            <a:extLst>
+              <a:ext uri="{FF2B5EF4-FFF2-40B4-BE49-F238E27FC236}">
+                <a16:creationId xmlns:a16="http://schemas.microsoft.com/office/drawing/2014/main" id="{D9197732-5287-64EE-B5C3-31790AED66D7}"/>
+              </a:ext>
+            </a:extLst>
+          </p:cNvPr>
+          <p:cNvSpPr>
+            <a:spLocks noGrp="1"/>
+          </p:cNvSpPr>
+          <p:nvPr>
+            <p:ph type="title"/>
+          </p:nvPr>
+        </p:nvSpPr>
+        <p:spPr/>
+        <p:txBody>
+          <a:bodyPr/>
+          <a:lstStyle/>
+          <a:p>
+            <a:r>
+              <a:rPr lang="en-US" dirty="0"/>
+              <a:t>Results/Analysis</a:t>
+            </a:r>
+          </a:p>
+        </p:txBody>
+      </p:sp>
+      <p:pic>
+        <p:nvPicPr>
+          <p:cNvPr id="5" name="Content Placeholder 4">
+            <a:extLst>
+              <a:ext uri="{FF2B5EF4-FFF2-40B4-BE49-F238E27FC236}">
+                <a16:creationId xmlns:a16="http://schemas.microsoft.com/office/drawing/2014/main" id="{BD043925-5EBF-834D-49DF-B60EA7213C9B}"/>
+              </a:ext>
+            </a:extLst>
+          </p:cNvPr>
+          <p:cNvPicPr>
+            <a:picLocks noGrp="1" noChangeAspect="1"/>
+          </p:cNvPicPr>
+          <p:nvPr>
+            <p:ph idx="1"/>
+          </p:nvPr>
+        </p:nvPicPr>
+        <p:blipFill>
+          <a:blip r:embed="rId2"/>
+          <a:stretch>
+            <a:fillRect/>
+          </a:stretch>
+        </p:blipFill>
+        <p:spPr>
+          <a:xfrm>
+            <a:off x="2409230" y="1577182"/>
+            <a:ext cx="7373540" cy="4915693"/>
+          </a:xfrm>
+        </p:spPr>
+      </p:pic>
+    </p:spTree>
+    <p:extLst>
+      <p:ext uri="{BB962C8B-B14F-4D97-AF65-F5344CB8AC3E}">
+        <p14:creationId xmlns:p14="http://schemas.microsoft.com/office/powerpoint/2010/main" val="1488451058"/>
+      </p:ext>
+    </p:extLst>
+  </p:cSld>
+  <p:clrMapOvr>
+    <a:masterClrMapping/>
+  </p:clrMapOvr>
+</p:sld>
+</file>
+
+<file path=ppt/slides/slide22.xml><?xml version="1.0" encoding="utf-8"?>
+<p:sld xmlns:a="http://schemas.openxmlformats.org/drawingml/2006/main" xmlns:r="http://schemas.openxmlformats.org/officeDocument/2006/relationships" xmlns:p="http://schemas.openxmlformats.org/presentationml/2006/main">
+  <p:cSld>
+    <p:bg>
+      <p:bgPr>
+        <a:solidFill>
+          <a:srgbClr val="D2B48C"/>
+        </a:solidFill>
+        <a:effectLst/>
+      </p:bgPr>
+    </p:bg>
+    <p:spTree>
+      <p:nvGrpSpPr>
+        <p:cNvPr id="1" name=""/>
+        <p:cNvGrpSpPr/>
+        <p:nvPr/>
+      </p:nvGrpSpPr>
+      <p:grpSpPr>
+        <a:xfrm>
+          <a:off x="0" y="0"/>
+          <a:ext cx="0" cy="0"/>
+          <a:chOff x="0" y="0"/>
+          <a:chExt cx="0" cy="0"/>
+        </a:xfrm>
+      </p:grpSpPr>
+      <p:sp>
+        <p:nvSpPr>
+          <p:cNvPr id="2" name="Title 1">
+            <a:extLst>
+              <a:ext uri="{FF2B5EF4-FFF2-40B4-BE49-F238E27FC236}">
+                <a16:creationId xmlns:a16="http://schemas.microsoft.com/office/drawing/2014/main" id="{D9197732-5287-64EE-B5C3-31790AED66D7}"/>
+              </a:ext>
+            </a:extLst>
+          </p:cNvPr>
+          <p:cNvSpPr>
+            <a:spLocks noGrp="1"/>
+          </p:cNvSpPr>
+          <p:nvPr>
+            <p:ph type="title"/>
+          </p:nvPr>
+        </p:nvSpPr>
+        <p:spPr/>
+        <p:txBody>
+          <a:bodyPr/>
+          <a:lstStyle/>
+          <a:p>
+            <a:r>
+              <a:rPr lang="en-US" dirty="0"/>
+              <a:t>Results/Analysis</a:t>
+            </a:r>
+          </a:p>
+        </p:txBody>
+      </p:sp>
+      <p:sp>
+        <p:nvSpPr>
+          <p:cNvPr id="8" name="Content Placeholder 7">
+            <a:extLst>
+              <a:ext uri="{FF2B5EF4-FFF2-40B4-BE49-F238E27FC236}">
+                <a16:creationId xmlns:a16="http://schemas.microsoft.com/office/drawing/2014/main" id="{4589CA36-D572-DD9C-6AD2-AB279FD3E04C}"/>
+              </a:ext>
+            </a:extLst>
+          </p:cNvPr>
+          <p:cNvSpPr>
+            <a:spLocks noGrp="1"/>
+          </p:cNvSpPr>
+          <p:nvPr>
+            <p:ph idx="1"/>
+          </p:nvPr>
+        </p:nvSpPr>
+        <p:spPr/>
+        <p:txBody>
+          <a:bodyPr>
+            <a:normAutofit/>
+          </a:bodyPr>
+          <a:lstStyle/>
+          <a:p>
+            <a:r>
+              <a:rPr lang="en-US" sz="2400" dirty="0">
+                <a:latin typeface="Corbel" panose="020B0503020204020204" pitchFamily="34" charset="0"/>
+              </a:rPr>
+              <a:t>Paper Shredding task:</a:t>
+            </a:r>
+          </a:p>
+          <a:p>
+            <a:r>
+              <a:rPr lang="en-US" sz="2400" dirty="0">
+                <a:latin typeface="Corbel" panose="020B0503020204020204" pitchFamily="34" charset="0"/>
+              </a:rPr>
+              <a:t>50% of the birds completed the task in about 5900 seconds (or 98 min)</a:t>
+            </a:r>
+          </a:p>
+          <a:p>
+            <a:r>
+              <a:rPr lang="en-US" sz="2400" dirty="0">
+                <a:latin typeface="Corbel" panose="020B0503020204020204" pitchFamily="34" charset="0"/>
+              </a:rPr>
+              <a:t>The more dominant birds completed this task faster</a:t>
+            </a:r>
+          </a:p>
+          <a:p>
+            <a:r>
+              <a:rPr lang="en-US" sz="2400" dirty="0">
+                <a:latin typeface="Corbel" panose="020B0503020204020204" pitchFamily="34" charset="0"/>
+              </a:rPr>
+              <a:t>The more exploratory birds outperformed the less exploratory</a:t>
+            </a:r>
+          </a:p>
+          <a:p>
+            <a:r>
+              <a:rPr lang="en-US" sz="2400" dirty="0">
+                <a:latin typeface="Corbel" panose="020B0503020204020204" pitchFamily="34" charset="0"/>
+              </a:rPr>
+              <a:t>The rural birds outperformed the urban birds</a:t>
+            </a:r>
+          </a:p>
+          <a:p>
+            <a:r>
+              <a:rPr lang="en-US" sz="2400" dirty="0">
+                <a:latin typeface="Corbel" panose="020B0503020204020204" pitchFamily="34" charset="0"/>
+              </a:rPr>
+              <a:t>The adults performed better at this task initially up to a point, given enough time the juveniles had a higher completion rate</a:t>
+            </a:r>
+          </a:p>
+          <a:p>
+            <a:r>
+              <a:rPr lang="en-US" sz="2400" dirty="0">
+                <a:latin typeface="Corbel" panose="020B0503020204020204" pitchFamily="34" charset="0"/>
+              </a:rPr>
+              <a:t>Only 29 out of 60 birds solved this task</a:t>
+            </a:r>
+          </a:p>
+          <a:p>
+            <a:r>
+              <a:rPr lang="en-US" sz="2400" dirty="0">
+                <a:latin typeface="Corbel" panose="020B0503020204020204" pitchFamily="34" charset="0"/>
+              </a:rPr>
+              <a:t>There are not enough observations in each group to create parametric curve on how dominance affects ability to rip paper to get at tasty worms</a:t>
+            </a:r>
+          </a:p>
+        </p:txBody>
+      </p:sp>
+    </p:spTree>
+    <p:extLst>
+      <p:ext uri="{BB962C8B-B14F-4D97-AF65-F5344CB8AC3E}">
+        <p14:creationId xmlns:p14="http://schemas.microsoft.com/office/powerpoint/2010/main" val="684821038"/>
+      </p:ext>
+    </p:extLst>
+  </p:cSld>
+  <p:clrMapOvr>
+    <a:masterClrMapping/>
+  </p:clrMapOvr>
+</p:sld>
+</file>
+
+<file path=ppt/slides/slide23.xml><?xml version="1.0" encoding="utf-8"?>
+<p:sld xmlns:a="http://schemas.openxmlformats.org/drawingml/2006/main" xmlns:r="http://schemas.openxmlformats.org/officeDocument/2006/relationships" xmlns:p="http://schemas.openxmlformats.org/presentationml/2006/main">
+  <p:cSld>
+    <p:bg>
+      <p:bgPr>
+        <a:solidFill>
+          <a:srgbClr val="D2B48C"/>
+        </a:solidFill>
+        <a:effectLst/>
+      </p:bgPr>
+    </p:bg>
+    <p:spTree>
+      <p:nvGrpSpPr>
+        <p:cNvPr id="1" name=""/>
+        <p:cNvGrpSpPr/>
+        <p:nvPr/>
+      </p:nvGrpSpPr>
+      <p:grpSpPr>
+        <a:xfrm>
+          <a:off x="0" y="0"/>
+          <a:ext cx="0" cy="0"/>
+          <a:chOff x="0" y="0"/>
+          <a:chExt cx="0" cy="0"/>
+        </a:xfrm>
+      </p:grpSpPr>
+      <p:sp>
+        <p:nvSpPr>
+          <p:cNvPr id="2" name="Title 1">
+            <a:extLst>
+              <a:ext uri="{FF2B5EF4-FFF2-40B4-BE49-F238E27FC236}">
+                <a16:creationId xmlns:a16="http://schemas.microsoft.com/office/drawing/2014/main" id="{D9197732-5287-64EE-B5C3-31790AED66D7}"/>
+              </a:ext>
+            </a:extLst>
+          </p:cNvPr>
+          <p:cNvSpPr>
+            <a:spLocks noGrp="1"/>
+          </p:cNvSpPr>
+          <p:nvPr>
+            <p:ph type="title"/>
+          </p:nvPr>
+        </p:nvSpPr>
+        <p:spPr/>
+        <p:txBody>
+          <a:bodyPr/>
+          <a:lstStyle/>
+          <a:p>
+            <a:r>
+              <a:rPr lang="en-US" dirty="0"/>
+              <a:t>Results/Analysis</a:t>
+            </a:r>
+          </a:p>
+        </p:txBody>
+      </p:sp>
+      <p:pic>
+        <p:nvPicPr>
+          <p:cNvPr id="5" name="Content Placeholder 4">
+            <a:extLst>
+              <a:ext uri="{FF2B5EF4-FFF2-40B4-BE49-F238E27FC236}">
+                <a16:creationId xmlns:a16="http://schemas.microsoft.com/office/drawing/2014/main" id="{62240081-4DB8-5F34-7FD4-2699180D20D5}"/>
+              </a:ext>
+            </a:extLst>
+          </p:cNvPr>
+          <p:cNvPicPr>
+            <a:picLocks noGrp="1" noChangeAspect="1"/>
+          </p:cNvPicPr>
+          <p:nvPr>
+            <p:ph idx="1"/>
+          </p:nvPr>
+        </p:nvPicPr>
+        <p:blipFill>
+          <a:blip r:embed="rId2"/>
+          <a:stretch>
+            <a:fillRect/>
+          </a:stretch>
+        </p:blipFill>
+        <p:spPr>
+          <a:xfrm>
+            <a:off x="2300287" y="1431925"/>
+            <a:ext cx="7591425" cy="5060950"/>
+          </a:xfrm>
+        </p:spPr>
+      </p:pic>
+    </p:spTree>
+    <p:extLst>
+      <p:ext uri="{BB962C8B-B14F-4D97-AF65-F5344CB8AC3E}">
+        <p14:creationId xmlns:p14="http://schemas.microsoft.com/office/powerpoint/2010/main" val="2321190572"/>
+      </p:ext>
+    </p:extLst>
+  </p:cSld>
+  <p:clrMapOvr>
+    <a:masterClrMapping/>
+  </p:clrMapOvr>
+</p:sld>
+</file>
+
+<file path=ppt/slides/slide24.xml><?xml version="1.0" encoding="utf-8"?>
+<p:sld xmlns:a="http://schemas.openxmlformats.org/drawingml/2006/main" xmlns:r="http://schemas.openxmlformats.org/officeDocument/2006/relationships" xmlns:p="http://schemas.openxmlformats.org/presentationml/2006/main">
+  <p:cSld>
+    <p:bg>
+      <p:bgPr>
+        <a:solidFill>
+          <a:srgbClr val="D2B48C"/>
+        </a:solidFill>
+        <a:effectLst/>
+      </p:bgPr>
+    </p:bg>
+    <p:spTree>
+      <p:nvGrpSpPr>
+        <p:cNvPr id="1" name=""/>
+        <p:cNvGrpSpPr/>
+        <p:nvPr/>
+      </p:nvGrpSpPr>
+      <p:grpSpPr>
+        <a:xfrm>
+          <a:off x="0" y="0"/>
+          <a:ext cx="0" cy="0"/>
+          <a:chOff x="0" y="0"/>
+          <a:chExt cx="0" cy="0"/>
+        </a:xfrm>
+      </p:grpSpPr>
+      <p:sp>
+        <p:nvSpPr>
+          <p:cNvPr id="2" name="Title 1">
+            <a:extLst>
+              <a:ext uri="{FF2B5EF4-FFF2-40B4-BE49-F238E27FC236}">
+                <a16:creationId xmlns:a16="http://schemas.microsoft.com/office/drawing/2014/main" id="{D9197732-5287-64EE-B5C3-31790AED66D7}"/>
+              </a:ext>
+            </a:extLst>
+          </p:cNvPr>
+          <p:cNvSpPr>
+            <a:spLocks noGrp="1"/>
+          </p:cNvSpPr>
+          <p:nvPr>
+            <p:ph type="title"/>
+          </p:nvPr>
+        </p:nvSpPr>
+        <p:spPr/>
+        <p:txBody>
+          <a:bodyPr/>
+          <a:lstStyle/>
+          <a:p>
+            <a:r>
+              <a:rPr lang="en-US" dirty="0"/>
+              <a:t>Results/Analysis</a:t>
+            </a:r>
+          </a:p>
+        </p:txBody>
+      </p:sp>
+      <p:pic>
+        <p:nvPicPr>
+          <p:cNvPr id="5" name="Content Placeholder 4" descr="Diagram, line chart&#10;&#10;Description automatically generated">
+            <a:extLst>
+              <a:ext uri="{FF2B5EF4-FFF2-40B4-BE49-F238E27FC236}">
+                <a16:creationId xmlns:a16="http://schemas.microsoft.com/office/drawing/2014/main" id="{8F244C30-30E9-9412-C0EC-3E393EE9269B}"/>
+              </a:ext>
+            </a:extLst>
+          </p:cNvPr>
+          <p:cNvPicPr>
+            <a:picLocks noGrp="1" noChangeAspect="1"/>
+          </p:cNvPicPr>
+          <p:nvPr>
+            <p:ph idx="1"/>
+          </p:nvPr>
+        </p:nvPicPr>
+        <p:blipFill>
+          <a:blip r:embed="rId2"/>
+          <a:stretch>
+            <a:fillRect/>
+          </a:stretch>
+        </p:blipFill>
+        <p:spPr>
+          <a:xfrm>
+            <a:off x="2172798" y="1462273"/>
+            <a:ext cx="7846403" cy="5030602"/>
+          </a:xfrm>
+        </p:spPr>
+      </p:pic>
+    </p:spTree>
+    <p:extLst>
+      <p:ext uri="{BB962C8B-B14F-4D97-AF65-F5344CB8AC3E}">
+        <p14:creationId xmlns:p14="http://schemas.microsoft.com/office/powerpoint/2010/main" val="319682821"/>
+      </p:ext>
+    </p:extLst>
+  </p:cSld>
+  <p:clrMapOvr>
+    <a:masterClrMapping/>
+  </p:clrMapOvr>
+</p:sld>
+</file>
+
+<file path=ppt/slides/slide25.xml><?xml version="1.0" encoding="utf-8"?>
+<p:sld xmlns:a="http://schemas.openxmlformats.org/drawingml/2006/main" xmlns:r="http://schemas.openxmlformats.org/officeDocument/2006/relationships" xmlns:p="http://schemas.openxmlformats.org/presentationml/2006/main">
+  <p:cSld>
+    <p:bg>
+      <p:bgPr>
+        <a:solidFill>
+          <a:srgbClr val="D2B48C"/>
+        </a:solidFill>
+        <a:effectLst/>
+      </p:bgPr>
+    </p:bg>
+    <p:spTree>
+      <p:nvGrpSpPr>
+        <p:cNvPr id="1" name=""/>
+        <p:cNvGrpSpPr/>
+        <p:nvPr/>
+      </p:nvGrpSpPr>
+      <p:grpSpPr>
+        <a:xfrm>
+          <a:off x="0" y="0"/>
+          <a:ext cx="0" cy="0"/>
+          <a:chOff x="0" y="0"/>
+          <a:chExt cx="0" cy="0"/>
+        </a:xfrm>
+      </p:grpSpPr>
+      <p:sp>
+        <p:nvSpPr>
+          <p:cNvPr id="2" name="Title 1">
+            <a:extLst>
+              <a:ext uri="{FF2B5EF4-FFF2-40B4-BE49-F238E27FC236}">
+                <a16:creationId xmlns:a16="http://schemas.microsoft.com/office/drawing/2014/main" id="{D9197732-5287-64EE-B5C3-31790AED66D7}"/>
+              </a:ext>
+            </a:extLst>
+          </p:cNvPr>
+          <p:cNvSpPr>
+            <a:spLocks noGrp="1"/>
+          </p:cNvSpPr>
+          <p:nvPr>
+            <p:ph type="title"/>
+          </p:nvPr>
+        </p:nvSpPr>
+        <p:spPr/>
+        <p:txBody>
+          <a:bodyPr/>
+          <a:lstStyle/>
+          <a:p>
+            <a:r>
+              <a:rPr lang="en-US" dirty="0"/>
+              <a:t>Results/Analysis</a:t>
+            </a:r>
+          </a:p>
+        </p:txBody>
+      </p:sp>
+      <p:pic>
+        <p:nvPicPr>
+          <p:cNvPr id="5" name="Content Placeholder 4">
+            <a:extLst>
+              <a:ext uri="{FF2B5EF4-FFF2-40B4-BE49-F238E27FC236}">
+                <a16:creationId xmlns:a16="http://schemas.microsoft.com/office/drawing/2014/main" id="{07E5006D-F765-B9F9-3EB4-D87E3D5059A5}"/>
+              </a:ext>
+            </a:extLst>
+          </p:cNvPr>
+          <p:cNvPicPr>
+            <a:picLocks noGrp="1" noChangeAspect="1"/>
+          </p:cNvPicPr>
+          <p:nvPr>
+            <p:ph idx="1"/>
+          </p:nvPr>
+        </p:nvPicPr>
+        <p:blipFill>
+          <a:blip r:embed="rId2"/>
+          <a:stretch>
+            <a:fillRect/>
+          </a:stretch>
+        </p:blipFill>
+        <p:spPr>
+          <a:xfrm>
+            <a:off x="1797844" y="1353344"/>
+            <a:ext cx="8596312" cy="5334000"/>
+          </a:xfrm>
+        </p:spPr>
+      </p:pic>
+    </p:spTree>
+    <p:extLst>
+      <p:ext uri="{BB962C8B-B14F-4D97-AF65-F5344CB8AC3E}">
+        <p14:creationId xmlns:p14="http://schemas.microsoft.com/office/powerpoint/2010/main" val="2610144448"/>
+      </p:ext>
+    </p:extLst>
+  </p:cSld>
+  <p:clrMapOvr>
+    <a:masterClrMapping/>
+  </p:clrMapOvr>
+</p:sld>
+</file>
+
+<file path=ppt/slides/slide26.xml><?xml version="1.0" encoding="utf-8"?>
+<p:sld xmlns:a="http://schemas.openxmlformats.org/drawingml/2006/main" xmlns:r="http://schemas.openxmlformats.org/officeDocument/2006/relationships" xmlns:p="http://schemas.openxmlformats.org/presentationml/2006/main">
+  <p:cSld>
+    <p:bg>
+      <p:bgPr>
+        <a:solidFill>
+          <a:srgbClr val="D2B48C"/>
+        </a:solidFill>
+        <a:effectLst/>
+      </p:bgPr>
+    </p:bg>
+    <p:spTree>
+      <p:nvGrpSpPr>
+        <p:cNvPr id="1" name=""/>
+        <p:cNvGrpSpPr/>
+        <p:nvPr/>
+      </p:nvGrpSpPr>
+      <p:grpSpPr>
+        <a:xfrm>
+          <a:off x="0" y="0"/>
+          <a:ext cx="0" cy="0"/>
+          <a:chOff x="0" y="0"/>
+          <a:chExt cx="0" cy="0"/>
+        </a:xfrm>
+      </p:grpSpPr>
+      <p:sp>
+        <p:nvSpPr>
+          <p:cNvPr id="2" name="Title 1">
+            <a:extLst>
+              <a:ext uri="{FF2B5EF4-FFF2-40B4-BE49-F238E27FC236}">
+                <a16:creationId xmlns:a16="http://schemas.microsoft.com/office/drawing/2014/main" id="{D9197732-5287-64EE-B5C3-31790AED66D7}"/>
+              </a:ext>
+            </a:extLst>
+          </p:cNvPr>
+          <p:cNvSpPr>
+            <a:spLocks noGrp="1"/>
+          </p:cNvSpPr>
+          <p:nvPr>
+            <p:ph type="title"/>
+          </p:nvPr>
+        </p:nvSpPr>
+        <p:spPr/>
+        <p:txBody>
+          <a:bodyPr/>
+          <a:lstStyle/>
+          <a:p>
+            <a:r>
+              <a:rPr lang="en-US" dirty="0"/>
+              <a:t>Results/Analysis</a:t>
+            </a:r>
+          </a:p>
+        </p:txBody>
+      </p:sp>
+      <p:pic>
+        <p:nvPicPr>
+          <p:cNvPr id="5" name="Content Placeholder 4">
+            <a:extLst>
+              <a:ext uri="{FF2B5EF4-FFF2-40B4-BE49-F238E27FC236}">
+                <a16:creationId xmlns:a16="http://schemas.microsoft.com/office/drawing/2014/main" id="{A075711D-C83C-4C44-10D5-E35218541BDD}"/>
+              </a:ext>
+            </a:extLst>
+          </p:cNvPr>
+          <p:cNvPicPr>
+            <a:picLocks noGrp="1" noChangeAspect="1"/>
+          </p:cNvPicPr>
+          <p:nvPr>
+            <p:ph idx="1"/>
+          </p:nvPr>
+        </p:nvPicPr>
+        <p:blipFill>
+          <a:blip r:embed="rId2"/>
+          <a:stretch>
+            <a:fillRect/>
+          </a:stretch>
+        </p:blipFill>
+        <p:spPr>
+          <a:xfrm>
+            <a:off x="2095500" y="1396207"/>
+            <a:ext cx="8001000" cy="5334000"/>
+          </a:xfrm>
+        </p:spPr>
+      </p:pic>
+    </p:spTree>
+    <p:extLst>
+      <p:ext uri="{BB962C8B-B14F-4D97-AF65-F5344CB8AC3E}">
+        <p14:creationId xmlns:p14="http://schemas.microsoft.com/office/powerpoint/2010/main" val="2092644311"/>
+      </p:ext>
+    </p:extLst>
+  </p:cSld>
+  <p:clrMapOvr>
+    <a:masterClrMapping/>
+  </p:clrMapOvr>
+</p:sld>
+</file>
+
+<file path=ppt/slides/slide27.xml><?xml version="1.0" encoding="utf-8"?>
+<p:sld xmlns:a="http://schemas.openxmlformats.org/drawingml/2006/main" xmlns:r="http://schemas.openxmlformats.org/officeDocument/2006/relationships" xmlns:p="http://schemas.openxmlformats.org/presentationml/2006/main">
+  <p:cSld>
+    <p:bg>
+      <p:bgPr>
+        <a:solidFill>
+          <a:srgbClr val="D2B48C"/>
+        </a:solidFill>
+        <a:effectLst/>
+      </p:bgPr>
+    </p:bg>
+    <p:spTree>
+      <p:nvGrpSpPr>
+        <p:cNvPr id="1" name=""/>
+        <p:cNvGrpSpPr/>
+        <p:nvPr/>
+      </p:nvGrpSpPr>
+      <p:grpSpPr>
+        <a:xfrm>
+          <a:off x="0" y="0"/>
+          <a:ext cx="0" cy="0"/>
+          <a:chOff x="0" y="0"/>
+          <a:chExt cx="0" cy="0"/>
+        </a:xfrm>
+      </p:grpSpPr>
+      <p:sp>
+        <p:nvSpPr>
+          <p:cNvPr id="2" name="Title 1">
+            <a:extLst>
+              <a:ext uri="{FF2B5EF4-FFF2-40B4-BE49-F238E27FC236}">
+                <a16:creationId xmlns:a16="http://schemas.microsoft.com/office/drawing/2014/main" id="{D9197732-5287-64EE-B5C3-31790AED66D7}"/>
+              </a:ext>
+            </a:extLst>
+          </p:cNvPr>
+          <p:cNvSpPr>
+            <a:spLocks noGrp="1"/>
+          </p:cNvSpPr>
+          <p:nvPr>
+            <p:ph type="title"/>
+          </p:nvPr>
+        </p:nvSpPr>
+        <p:spPr/>
+        <p:txBody>
+          <a:bodyPr/>
+          <a:lstStyle/>
+          <a:p>
+            <a:r>
+              <a:rPr lang="en-US" dirty="0"/>
+              <a:t>Results/Analysis</a:t>
+            </a:r>
+          </a:p>
+        </p:txBody>
+      </p:sp>
+      <p:pic>
+        <p:nvPicPr>
+          <p:cNvPr id="5" name="Content Placeholder 4">
+            <a:extLst>
+              <a:ext uri="{FF2B5EF4-FFF2-40B4-BE49-F238E27FC236}">
+                <a16:creationId xmlns:a16="http://schemas.microsoft.com/office/drawing/2014/main" id="{561570C6-EBC5-3BAD-EC99-1600254A1861}"/>
+              </a:ext>
+            </a:extLst>
+          </p:cNvPr>
+          <p:cNvPicPr>
+            <a:picLocks noGrp="1" noChangeAspect="1"/>
+          </p:cNvPicPr>
+          <p:nvPr>
+            <p:ph idx="1"/>
+          </p:nvPr>
+        </p:nvPicPr>
+        <p:blipFill>
+          <a:blip r:embed="rId2"/>
+          <a:stretch>
+            <a:fillRect/>
+          </a:stretch>
+        </p:blipFill>
+        <p:spPr>
+          <a:xfrm>
+            <a:off x="2344484" y="1490854"/>
+            <a:ext cx="7503032" cy="5002021"/>
+          </a:xfrm>
+        </p:spPr>
+      </p:pic>
+    </p:spTree>
+    <p:extLst>
+      <p:ext uri="{BB962C8B-B14F-4D97-AF65-F5344CB8AC3E}">
+        <p14:creationId xmlns:p14="http://schemas.microsoft.com/office/powerpoint/2010/main" val="3408186284"/>
+      </p:ext>
+    </p:extLst>
+  </p:cSld>
+  <p:clrMapOvr>
+    <a:masterClrMapping/>
+  </p:clrMapOvr>
+</p:sld>
+</file>
+
+<file path=ppt/slides/slide28.xml><?xml version="1.0" encoding="utf-8"?>
+<p:sld xmlns:a="http://schemas.openxmlformats.org/drawingml/2006/main" xmlns:r="http://schemas.openxmlformats.org/officeDocument/2006/relationships" xmlns:p="http://schemas.openxmlformats.org/presentationml/2006/main">
+  <p:cSld>
+    <p:bg>
+      <p:bgPr>
+        <a:solidFill>
+          <a:srgbClr val="D2B48C"/>
+        </a:solidFill>
+        <a:effectLst/>
+      </p:bgPr>
+    </p:bg>
+    <p:spTree>
+      <p:nvGrpSpPr>
+        <p:cNvPr id="1" name=""/>
+        <p:cNvGrpSpPr/>
+        <p:nvPr/>
+      </p:nvGrpSpPr>
+      <p:grpSpPr>
+        <a:xfrm>
+          <a:off x="0" y="0"/>
+          <a:ext cx="0" cy="0"/>
+          <a:chOff x="0" y="0"/>
+          <a:chExt cx="0" cy="0"/>
+        </a:xfrm>
+      </p:grpSpPr>
+      <p:sp>
+        <p:nvSpPr>
+          <p:cNvPr id="2" name="Title 1">
+            <a:extLst>
+              <a:ext uri="{FF2B5EF4-FFF2-40B4-BE49-F238E27FC236}">
+                <a16:creationId xmlns:a16="http://schemas.microsoft.com/office/drawing/2014/main" id="{D9197732-5287-64EE-B5C3-31790AED66D7}"/>
+              </a:ext>
+            </a:extLst>
+          </p:cNvPr>
+          <p:cNvSpPr>
+            <a:spLocks noGrp="1"/>
+          </p:cNvSpPr>
+          <p:nvPr>
+            <p:ph type="title"/>
+          </p:nvPr>
+        </p:nvSpPr>
+        <p:spPr/>
+        <p:txBody>
+          <a:bodyPr/>
+          <a:lstStyle/>
+          <a:p>
+            <a:r>
+              <a:rPr lang="en-US" dirty="0"/>
+              <a:t>Results/Analysis</a:t>
+            </a:r>
+          </a:p>
+        </p:txBody>
+      </p:sp>
+      <p:pic>
+        <p:nvPicPr>
+          <p:cNvPr id="5" name="Content Placeholder 4">
+            <a:extLst>
+              <a:ext uri="{FF2B5EF4-FFF2-40B4-BE49-F238E27FC236}">
+                <a16:creationId xmlns:a16="http://schemas.microsoft.com/office/drawing/2014/main" id="{CA757BEE-2E8E-9159-5A5F-FB237D7B9143}"/>
+              </a:ext>
+            </a:extLst>
+          </p:cNvPr>
+          <p:cNvPicPr>
+            <a:picLocks noGrp="1" noChangeAspect="1"/>
+          </p:cNvPicPr>
+          <p:nvPr>
+            <p:ph idx="1"/>
+          </p:nvPr>
+        </p:nvPicPr>
+        <p:blipFill>
+          <a:blip r:embed="rId2"/>
+          <a:stretch>
+            <a:fillRect/>
+          </a:stretch>
+        </p:blipFill>
+        <p:spPr>
+          <a:xfrm>
+            <a:off x="2298870" y="1430036"/>
+            <a:ext cx="7594259" cy="5062839"/>
+          </a:xfrm>
+        </p:spPr>
+      </p:pic>
+    </p:spTree>
+    <p:extLst>
+      <p:ext uri="{BB962C8B-B14F-4D97-AF65-F5344CB8AC3E}">
+        <p14:creationId xmlns:p14="http://schemas.microsoft.com/office/powerpoint/2010/main" val="1499100549"/>
+      </p:ext>
+    </p:extLst>
+  </p:cSld>
+  <p:clrMapOvr>
+    <a:masterClrMapping/>
+  </p:clrMapOvr>
+</p:sld>
+</file>
+
+<file path=ppt/slides/slide29.xml><?xml version="1.0" encoding="utf-8"?>
+<p:sld xmlns:a="http://schemas.openxmlformats.org/drawingml/2006/main" xmlns:r="http://schemas.openxmlformats.org/officeDocument/2006/relationships" xmlns:p="http://schemas.openxmlformats.org/presentationml/2006/main">
+  <p:cSld>
+    <p:bg>
+      <p:bgPr>
+        <a:solidFill>
+          <a:srgbClr val="D2B48C"/>
+        </a:solidFill>
+        <a:effectLst/>
+      </p:bgPr>
+    </p:bg>
+    <p:spTree>
+      <p:nvGrpSpPr>
+        <p:cNvPr id="1" name=""/>
+        <p:cNvGrpSpPr/>
+        <p:nvPr/>
+      </p:nvGrpSpPr>
+      <p:grpSpPr>
+        <a:xfrm>
+          <a:off x="0" y="0"/>
+          <a:ext cx="0" cy="0"/>
+          <a:chOff x="0" y="0"/>
+          <a:chExt cx="0" cy="0"/>
+        </a:xfrm>
+      </p:grpSpPr>
+      <p:sp>
+        <p:nvSpPr>
+          <p:cNvPr id="2" name="Title 1">
+            <a:extLst>
+              <a:ext uri="{FF2B5EF4-FFF2-40B4-BE49-F238E27FC236}">
+                <a16:creationId xmlns:a16="http://schemas.microsoft.com/office/drawing/2014/main" id="{D9197732-5287-64EE-B5C3-31790AED66D7}"/>
+              </a:ext>
+            </a:extLst>
+          </p:cNvPr>
+          <p:cNvSpPr>
+            <a:spLocks noGrp="1"/>
+          </p:cNvSpPr>
+          <p:nvPr>
+            <p:ph type="title"/>
+          </p:nvPr>
+        </p:nvSpPr>
+        <p:spPr/>
+        <p:txBody>
+          <a:bodyPr/>
+          <a:lstStyle/>
+          <a:p>
+            <a:r>
+              <a:rPr lang="en-US" dirty="0"/>
+              <a:t>Results/Analysis</a:t>
+            </a:r>
+          </a:p>
+        </p:txBody>
+      </p:sp>
+      <p:pic>
+        <p:nvPicPr>
+          <p:cNvPr id="5" name="Content Placeholder 4">
+            <a:extLst>
+              <a:ext uri="{FF2B5EF4-FFF2-40B4-BE49-F238E27FC236}">
+                <a16:creationId xmlns:a16="http://schemas.microsoft.com/office/drawing/2014/main" id="{80B59704-E755-B678-01CA-A7A8FB280C3D}"/>
+              </a:ext>
+            </a:extLst>
+          </p:cNvPr>
+          <p:cNvPicPr>
+            <a:picLocks noGrp="1" noChangeAspect="1"/>
+          </p:cNvPicPr>
+          <p:nvPr>
+            <p:ph idx="1"/>
+          </p:nvPr>
+        </p:nvPicPr>
+        <p:blipFill>
+          <a:blip r:embed="rId2"/>
+          <a:stretch>
+            <a:fillRect/>
+          </a:stretch>
+        </p:blipFill>
+        <p:spPr>
+          <a:xfrm>
+            <a:off x="2249214" y="1439917"/>
+            <a:ext cx="7846506" cy="5231004"/>
+          </a:xfrm>
+        </p:spPr>
+      </p:pic>
+    </p:spTree>
+    <p:extLst>
+      <p:ext uri="{BB962C8B-B14F-4D97-AF65-F5344CB8AC3E}">
+        <p14:creationId xmlns:p14="http://schemas.microsoft.com/office/powerpoint/2010/main" val="2082646864"/>
+      </p:ext>
+    </p:extLst>
+  </p:cSld>
+  <p:clrMapOvr>
+    <a:masterClrMapping/>
+  </p:clrMapOvr>
+</p:sld>
+</file>
+
 <file path=ppt/slides/slide3.xml><?xml version="1.0" encoding="utf-8"?>
 <p:sld xmlns:a="http://schemas.openxmlformats.org/drawingml/2006/main" xmlns:r="http://schemas.openxmlformats.org/officeDocument/2006/relationships" xmlns:p="http://schemas.openxmlformats.org/presentationml/2006/main">
   <p:cSld>
@@ -17353,6 +19372,176 @@
     <p:extLst>
       <p:ext uri="{BB962C8B-B14F-4D97-AF65-F5344CB8AC3E}">
         <p14:creationId xmlns:p14="http://schemas.microsoft.com/office/powerpoint/2010/main" val="1887990806"/>
+      </p:ext>
+    </p:extLst>
+  </p:cSld>
+  <p:clrMapOvr>
+    <a:masterClrMapping/>
+  </p:clrMapOvr>
+</p:sld>
+</file>
+
+<file path=ppt/slides/slide30.xml><?xml version="1.0" encoding="utf-8"?>
+<p:sld xmlns:a="http://schemas.openxmlformats.org/drawingml/2006/main" xmlns:r="http://schemas.openxmlformats.org/officeDocument/2006/relationships" xmlns:p="http://schemas.openxmlformats.org/presentationml/2006/main">
+  <p:cSld>
+    <p:bg>
+      <p:bgPr>
+        <a:solidFill>
+          <a:srgbClr val="D2B48C"/>
+        </a:solidFill>
+        <a:effectLst/>
+      </p:bgPr>
+    </p:bg>
+    <p:spTree>
+      <p:nvGrpSpPr>
+        <p:cNvPr id="1" name=""/>
+        <p:cNvGrpSpPr/>
+        <p:nvPr/>
+      </p:nvGrpSpPr>
+      <p:grpSpPr>
+        <a:xfrm>
+          <a:off x="0" y="0"/>
+          <a:ext cx="0" cy="0"/>
+          <a:chOff x="0" y="0"/>
+          <a:chExt cx="0" cy="0"/>
+        </a:xfrm>
+      </p:grpSpPr>
+      <p:sp>
+        <p:nvSpPr>
+          <p:cNvPr id="2" name="Title 1">
+            <a:extLst>
+              <a:ext uri="{FF2B5EF4-FFF2-40B4-BE49-F238E27FC236}">
+                <a16:creationId xmlns:a16="http://schemas.microsoft.com/office/drawing/2014/main" id="{D9197732-5287-64EE-B5C3-31790AED66D7}"/>
+              </a:ext>
+            </a:extLst>
+          </p:cNvPr>
+          <p:cNvSpPr>
+            <a:spLocks noGrp="1"/>
+          </p:cNvSpPr>
+          <p:nvPr>
+            <p:ph type="title"/>
+          </p:nvPr>
+        </p:nvSpPr>
+        <p:spPr/>
+        <p:txBody>
+          <a:bodyPr/>
+          <a:lstStyle/>
+          <a:p>
+            <a:r>
+              <a:rPr lang="en-US" dirty="0"/>
+              <a:t>Conclusions</a:t>
+            </a:r>
+          </a:p>
+        </p:txBody>
+      </p:sp>
+      <p:sp>
+        <p:nvSpPr>
+          <p:cNvPr id="8" name="Content Placeholder 7">
+            <a:extLst>
+              <a:ext uri="{FF2B5EF4-FFF2-40B4-BE49-F238E27FC236}">
+                <a16:creationId xmlns:a16="http://schemas.microsoft.com/office/drawing/2014/main" id="{4589CA36-D572-DD9C-6AD2-AB279FD3E04C}"/>
+              </a:ext>
+            </a:extLst>
+          </p:cNvPr>
+          <p:cNvSpPr>
+            <a:spLocks noGrp="1"/>
+          </p:cNvSpPr>
+          <p:nvPr>
+            <p:ph idx="1"/>
+          </p:nvPr>
+        </p:nvSpPr>
+        <p:spPr/>
+        <p:txBody>
+          <a:bodyPr>
+            <a:normAutofit fontScale="92500"/>
+          </a:bodyPr>
+          <a:lstStyle/>
+          <a:p>
+            <a:r>
+              <a:rPr lang="en-US" sz="2400" dirty="0">
+                <a:solidFill>
+                  <a:srgbClr val="202020"/>
+                </a:solidFill>
+                <a:latin typeface="Corbel" panose="020B0503020204020204" pitchFamily="34" charset="0"/>
+              </a:rPr>
+              <a:t>W</a:t>
+            </a:r>
+            <a:r>
+              <a:rPr lang="en-US" sz="2400" b="0" i="0" u="none" strike="noStrike" dirty="0">
+                <a:solidFill>
+                  <a:srgbClr val="202020"/>
+                </a:solidFill>
+                <a:effectLst/>
+                <a:latin typeface="Corbel" panose="020B0503020204020204" pitchFamily="34" charset="0"/>
+              </a:rPr>
+              <a:t>e found a trend that the more dominant birds and adults performed better overall for both tasks</a:t>
+            </a:r>
+          </a:p>
+          <a:p>
+            <a:r>
+              <a:rPr lang="en-US" sz="2400" b="0" i="0" u="none" strike="noStrike" dirty="0">
+                <a:solidFill>
+                  <a:srgbClr val="202020"/>
+                </a:solidFill>
+                <a:effectLst/>
+                <a:latin typeface="Corbel" panose="020B0503020204020204" pitchFamily="34" charset="0"/>
+              </a:rPr>
+              <a:t>For the paper ripping task, we also saw higher performance for the rural birds, and those who were more exploratory</a:t>
+            </a:r>
+          </a:p>
+          <a:p>
+            <a:r>
+              <a:rPr lang="en-US" sz="2400" b="0" i="0" u="none" strike="noStrike" dirty="0">
+                <a:solidFill>
+                  <a:srgbClr val="202020"/>
+                </a:solidFill>
+                <a:effectLst/>
+                <a:latin typeface="Corbel" panose="020B0503020204020204" pitchFamily="34" charset="0"/>
+              </a:rPr>
+              <a:t>Individual performance and persistence were not repeatable across tasks, and the traits defining the most innovative and persistent individuals in each task were not consistent, pointing to the need for experimental assessments on the effect of task characteristics on the repeatability of problem-solving performance and persistence. </a:t>
+            </a:r>
+          </a:p>
+          <a:p>
+            <a:r>
+              <a:rPr lang="en-US" sz="2400" b="0" i="0" u="none" strike="noStrike" dirty="0">
+                <a:solidFill>
+                  <a:srgbClr val="202020"/>
+                </a:solidFill>
+                <a:effectLst/>
+                <a:latin typeface="Corbel" panose="020B0503020204020204" pitchFamily="34" charset="0"/>
+              </a:rPr>
+              <a:t>Overall, our findings suggest that different individual and ecological characteristics may facilitate innovative behavior in different ecological contexts.</a:t>
+            </a:r>
+          </a:p>
+          <a:p>
+            <a:r>
+              <a:rPr lang="en-US" sz="2400" dirty="0">
+                <a:solidFill>
+                  <a:srgbClr val="202020"/>
+                </a:solidFill>
+                <a:latin typeface="Corbel" panose="020B0503020204020204" pitchFamily="34" charset="0"/>
+              </a:rPr>
+              <a:t>This was an observational study so we can show associations, but not show a causal result</a:t>
+            </a:r>
+            <a:endParaRPr lang="en-US" sz="2400" b="0" i="0" u="none" strike="noStrike" dirty="0">
+              <a:solidFill>
+                <a:srgbClr val="202020"/>
+              </a:solidFill>
+              <a:effectLst/>
+              <a:latin typeface="Corbel" panose="020B0503020204020204" pitchFamily="34" charset="0"/>
+            </a:endParaRPr>
+          </a:p>
+          <a:p>
+            <a:endParaRPr lang="en-US" sz="2400" dirty="0">
+              <a:latin typeface="Corbel" panose="020B0503020204020204" pitchFamily="34" charset="0"/>
+            </a:endParaRPr>
+          </a:p>
+        </p:txBody>
+      </p:sp>
+    </p:spTree>
+    <p:extLst>
+      <p:ext uri="{BB962C8B-B14F-4D97-AF65-F5344CB8AC3E}">
+        <p14:creationId xmlns:p14="http://schemas.microsoft.com/office/powerpoint/2010/main" val="217900715"/>
       </p:ext>
     </p:extLst>
   </p:cSld>
@@ -17447,6 +19636,22 @@
               </a:rPr>
               <a:t>What was the overall time to solving the problems for chickadees? </a:t>
             </a:r>
+            <a:r>
+              <a:rPr lang="en-US" sz="2400" dirty="0">
+                <a:effectLst/>
+                <a:latin typeface="Corbel" panose="020B0503020204020204" pitchFamily="34" charset="0"/>
+                <a:ea typeface="Times New Roman" panose="02020603050405020304" pitchFamily="18" charset="0"/>
+                <a:cs typeface="Times New Roman" panose="02020603050405020304" pitchFamily="18" charset="0"/>
+              </a:rPr>
+              <a:t>(lever pulling, paper ripping, and persistence &amp; repeatability)</a:t>
+            </a:r>
+            <a:r>
+              <a:rPr lang="en-US" sz="2400" dirty="0">
+                <a:effectLst/>
+                <a:latin typeface="Corbel" panose="020B0503020204020204" pitchFamily="34" charset="0"/>
+              </a:rPr>
+              <a:t> </a:t>
+            </a:r>
           </a:p>
           <a:p>
             <a:pPr marL="0" indent="0">
@@ -17505,12 +19710,6 @@
               </a:rPr>
               <a:t>, Canada.</a:t>
             </a:r>
-            <a:endParaRPr lang="en-US" sz="2400" dirty="0">
-              <a:effectLst/>
-              <a:latin typeface="Calibri" panose="020F0502020204030204" pitchFamily="34" charset="0"/>
-              <a:ea typeface="Calibri" panose="020F0502020204030204" pitchFamily="34" charset="0"/>
-              <a:cs typeface="Times New Roman" panose="02020603050405020304" pitchFamily="18" charset="0"/>
-            </a:endParaRPr>
           </a:p>
         </p:txBody>
       </p:sp>
@@ -17598,73 +19797,164 @@
         </p:nvSpPr>
         <p:spPr/>
         <p:txBody>
-          <a:bodyPr/>
+          <a:bodyPr>
+            <a:noAutofit/>
+          </a:bodyPr>
           <a:lstStyle/>
           <a:p>
             <a:r>
-              <a:rPr lang="en-US" dirty="0"/>
-              <a:t>2 trials: lever and paper, here’s what they were tested on…</a:t>
-            </a:r>
-            <a:r>
-              <a:rPr lang="en-US" sz="2800" dirty="0">
+              <a:rPr lang="en-US" sz="2000" dirty="0">
+                <a:solidFill>
+                  <a:srgbClr val="000000"/>
+                </a:solidFill>
                 <a:effectLst/>
                 <a:latin typeface="Corbel" panose="020B0503020204020204" pitchFamily="34" charset="0"/>
-                <a:ea typeface="Calibri" panose="020F0502020204030204" pitchFamily="34" charset="0"/>
-                <a:cs typeface="Times New Roman" panose="02020603050405020304" pitchFamily="18" charset="0"/>
               </a:rPr>
-              <a:t> lever pulling, paper ripping, and persistence &amp; repeatability) </a:t>
-            </a:r>
-          </a:p>
-          <a:p>
-            <a:endParaRPr lang="en-US" dirty="0"/>
+              <a:t>We investigated the effects of dominance rank, exploratory tendency, and urbanization on the individual problem-solving performance of wild-caught black-capped chickadees (</a:t>
+            </a:r>
+            <a:r>
+              <a:rPr lang="en-US" sz="2000" i="1" dirty="0" err="1">
+                <a:solidFill>
+                  <a:srgbClr val="000000"/>
+                </a:solidFill>
+                <a:effectLst/>
+                <a:latin typeface="Corbel" panose="020B0503020204020204" pitchFamily="34" charset="0"/>
+              </a:rPr>
+              <a:t>Poecile</a:t>
+            </a:r>
+            <a:r>
+              <a:rPr lang="en-US" sz="2000" i="1" dirty="0">
+                <a:solidFill>
+                  <a:srgbClr val="000000"/>
+                </a:solidFill>
+                <a:effectLst/>
+                <a:latin typeface="Corbel" panose="020B0503020204020204" pitchFamily="34" charset="0"/>
+              </a:rPr>
+              <a:t> atricapillus</a:t>
+            </a:r>
+            <a:r>
+              <a:rPr lang="en-US" sz="2000" dirty="0">
+                <a:solidFill>
+                  <a:srgbClr val="000000"/>
+                </a:solidFill>
+                <a:effectLst/>
+                <a:latin typeface="Corbel" panose="020B0503020204020204" pitchFamily="34" charset="0"/>
+              </a:rPr>
+              <a:t>) using two distinct foraging tasks. </a:t>
+            </a:r>
+            <a:br>
+              <a:rPr lang="en-US" sz="2000" dirty="0">
+                <a:solidFill>
+                  <a:srgbClr val="000000"/>
+                </a:solidFill>
+                <a:effectLst/>
+                <a:latin typeface="Corbel" panose="020B0503020204020204" pitchFamily="34" charset="0"/>
+              </a:rPr>
+            </a:br>
+            <a:endParaRPr lang="en-US" sz="2000" dirty="0">
+              <a:solidFill>
+                <a:srgbClr val="000000"/>
+              </a:solidFill>
+              <a:effectLst/>
+              <a:latin typeface="Corbel" panose="020B0503020204020204" pitchFamily="34" charset="0"/>
+            </a:endParaRPr>
+          </a:p>
+          <a:p>
+            <a:r>
+              <a:rPr lang="en-US" sz="2000" dirty="0">
+                <a:solidFill>
+                  <a:srgbClr val="000000"/>
+                </a:solidFill>
+                <a:effectLst/>
+                <a:latin typeface="Corbel" panose="020B0503020204020204" pitchFamily="34" charset="0"/>
+              </a:rPr>
+              <a:t>From October to December 2016, a maximum of 12 birds were captured weekly using mist nets from one of seven sites in and around Ottawa, Ontario, and a total sample size of 65</a:t>
+            </a:r>
+            <a:r>
+              <a:rPr lang="en-US" sz="2000" dirty="0">
+                <a:solidFill>
+                  <a:srgbClr val="000000"/>
+                </a:solidFill>
+                <a:latin typeface="Corbel" panose="020B0503020204020204" pitchFamily="34" charset="0"/>
+              </a:rPr>
+              <a:t> birds were used in the study.</a:t>
+            </a:r>
+            <a:br>
+              <a:rPr lang="en-US" sz="2000" dirty="0">
+                <a:solidFill>
+                  <a:srgbClr val="000000"/>
+                </a:solidFill>
+                <a:effectLst/>
+                <a:latin typeface="Corbel" panose="020B0503020204020204" pitchFamily="34" charset="0"/>
+              </a:rPr>
+            </a:br>
+            <a:endParaRPr lang="en-US" sz="2000" dirty="0">
+              <a:solidFill>
+                <a:srgbClr val="000000"/>
+              </a:solidFill>
+              <a:effectLst/>
+              <a:latin typeface="Corbel" panose="020B0503020204020204" pitchFamily="34" charset="0"/>
+            </a:endParaRPr>
+          </a:p>
+          <a:p>
+            <a:r>
+              <a:rPr lang="en-US" sz="2000" dirty="0">
+                <a:solidFill>
+                  <a:srgbClr val="000000"/>
+                </a:solidFill>
+                <a:effectLst/>
+                <a:latin typeface="Corbel" panose="020B0503020204020204" pitchFamily="34" charset="0"/>
+              </a:rPr>
+              <a:t>Urban sites were urban parks surrounded by houses and located no more than 10 km from down- town Ottawa, and rural sites were forested areas in a rural landscape at least 25 km from down- town. </a:t>
+            </a:r>
+            <a:br>
+              <a:rPr lang="en-US" sz="2000" dirty="0">
+                <a:solidFill>
+                  <a:srgbClr val="000000"/>
+                </a:solidFill>
+                <a:effectLst/>
+                <a:latin typeface="Corbel" panose="020B0503020204020204" pitchFamily="34" charset="0"/>
+              </a:rPr>
+            </a:br>
+            <a:endParaRPr lang="en-US" sz="2000" dirty="0">
+              <a:solidFill>
+                <a:srgbClr val="000000"/>
+              </a:solidFill>
+              <a:effectLst/>
+              <a:latin typeface="Corbel" panose="020B0503020204020204" pitchFamily="34" charset="0"/>
+            </a:endParaRPr>
+          </a:p>
+          <a:p>
+            <a:r>
+              <a:rPr lang="en-US" sz="2000" dirty="0">
+                <a:solidFill>
+                  <a:srgbClr val="000000"/>
+                </a:solidFill>
+                <a:effectLst/>
+                <a:latin typeface="Corbel" panose="020B0503020204020204" pitchFamily="34" charset="0"/>
+              </a:rPr>
+              <a:t>Birds were categorized as juvenile (bird born in the previous spring) or adult (more than one year old) by inspecting the shape and wear of their tail feathers</a:t>
+            </a:r>
+          </a:p>
+          <a:p>
+            <a:pPr marR="0" lvl="0">
+              <a:buSzPct val="100000"/>
+              <a:tabLst>
+                <a:tab pos="457200" algn="l"/>
+              </a:tabLst>
+            </a:pPr>
+            <a:endParaRPr lang="en-US" sz="2000" dirty="0">
+              <a:effectLst/>
+              <a:latin typeface="Corbel" panose="020B0503020204020204" pitchFamily="34" charset="0"/>
+              <a:ea typeface="Times New Roman" panose="02020603050405020304" pitchFamily="18" charset="0"/>
+            </a:endParaRPr>
           </a:p>
         </p:txBody>
       </p:sp>
-      <p:pic>
-        <p:nvPicPr>
-          <p:cNvPr id="3" name="Content Placeholder 4" descr="A picture containing floor&#10;&#10;Description automatically generated">
-            <a:extLst>
-              <a:ext uri="{FF2B5EF4-FFF2-40B4-BE49-F238E27FC236}">
-                <a16:creationId xmlns:a16="http://schemas.microsoft.com/office/drawing/2014/main" id="{902CF520-33B5-4395-DAB0-9D53430B2872}"/>
-              </a:ext>
-            </a:extLst>
-          </p:cNvPr>
-          <p:cNvPicPr>
-            <a:picLocks noChangeAspect="1"/>
-          </p:cNvPicPr>
-          <p:nvPr/>
-        </p:nvPicPr>
-        <p:blipFill>
-          <a:blip r:embed="rId2" cstate="print">
-            <a:extLst>
-              <a:ext uri="{28A0092B-C50C-407E-A947-70E740481C1C}">
-                <a14:useLocalDpi xmlns:a14="http://schemas.microsoft.com/office/drawing/2010/main" val="0"/>
-              </a:ext>
-            </a:extLst>
-          </a:blip>
-          <a:srcRect/>
-          <a:stretch>
-            <a:fillRect/>
-          </a:stretch>
-        </p:blipFill>
-        <p:spPr bwMode="auto">
-          <a:xfrm>
-            <a:off x="2365812" y="2787337"/>
-            <a:ext cx="7020417" cy="3855229"/>
-          </a:xfrm>
-          <a:prstGeom prst="rect">
-            <a:avLst/>
-          </a:prstGeom>
-          <a:noFill/>
-          <a:ln>
-            <a:noFill/>
-          </a:ln>
-        </p:spPr>
-      </p:pic>
     </p:spTree>
     <p:extLst>
       <p:ext uri="{BB962C8B-B14F-4D97-AF65-F5344CB8AC3E}">
-        <p14:creationId xmlns:p14="http://schemas.microsoft.com/office/powerpoint/2010/main" val="1040092609"/>
+        <p14:creationId xmlns:p14="http://schemas.microsoft.com/office/powerpoint/2010/main" val="3420986277"/>
       </p:ext>
     </p:extLst>
   </p:cSld>
@@ -17746,103 +20036,56 @@
         <p:spPr/>
         <p:txBody>
           <a:bodyPr>
-            <a:normAutofit/>
+            <a:noAutofit/>
           </a:bodyPr>
           <a:lstStyle/>
           <a:p>
-            <a:pPr marR="0" lvl="0">
-              <a:buSzPct val="100000"/>
-              <a:tabLst>
-                <a:tab pos="457200" algn="l"/>
-              </a:tabLst>
-            </a:pPr>
             <a:r>
               <a:rPr lang="en-US" sz="2400" dirty="0">
                 <a:effectLst/>
                 <a:latin typeface="Corbel" panose="020B0503020204020204" pitchFamily="34" charset="0"/>
-                <a:ea typeface="Times New Roman" panose="02020603050405020304" pitchFamily="18" charset="0"/>
               </a:rPr>
-              <a:t>How was the data collected? </a:t>
-            </a:r>
-          </a:p>
-          <a:p>
-            <a:pPr marR="0" lvl="0">
-              <a:buSzPct val="100000"/>
-              <a:tabLst>
-                <a:tab pos="457200" algn="l"/>
-              </a:tabLst>
-            </a:pPr>
+              <a:t>We coded individuals that failed to solve during the experiment as censored observations, since we do not know their true latency to solve (right censored)</a:t>
+            </a:r>
+          </a:p>
+          <a:p>
             <a:r>
               <a:rPr lang="en-US" sz="2400" dirty="0">
-                <a:effectLst/>
                 <a:latin typeface="Corbel" panose="020B0503020204020204" pitchFamily="34" charset="0"/>
-                <a:ea typeface="Times New Roman" panose="02020603050405020304" pitchFamily="18" charset="0"/>
               </a:rPr>
-              <a:t>What data was collected? </a:t>
-            </a:r>
-          </a:p>
-          <a:p>
-            <a:pPr marR="0" lvl="1">
-              <a:buSzPct val="100000"/>
-              <a:tabLst>
-                <a:tab pos="914400" algn="l"/>
-              </a:tabLst>
-            </a:pPr>
-            <a:r>
-              <a:rPr lang="en-US" dirty="0">
-                <a:effectLst/>
+              <a:t>There was a total of 65 birds in the dataset</a:t>
+            </a:r>
+          </a:p>
+          <a:p>
+            <a:r>
+              <a:rPr lang="en-US" sz="2400" dirty="0">
                 <a:latin typeface="Corbel" panose="020B0503020204020204" pitchFamily="34" charset="0"/>
-                <a:ea typeface="Times New Roman" panose="02020603050405020304" pitchFamily="18" charset="0"/>
               </a:rPr>
-              <a:t>response variables </a:t>
-            </a:r>
-          </a:p>
-          <a:p>
-            <a:pPr marR="0" lvl="1">
-              <a:buSzPct val="100000"/>
-              <a:tabLst>
-                <a:tab pos="914400" algn="l"/>
-              </a:tabLst>
-            </a:pPr>
-            <a:r>
-              <a:rPr lang="en-US" dirty="0">
-                <a:effectLst/>
+              <a:t>In the lever pulling task: 27 birds were censored</a:t>
+            </a:r>
+          </a:p>
+          <a:p>
+            <a:r>
+              <a:rPr lang="en-US" sz="2400" dirty="0">
                 <a:latin typeface="Corbel" panose="020B0503020204020204" pitchFamily="34" charset="0"/>
-                <a:ea typeface="Times New Roman" panose="02020603050405020304" pitchFamily="18" charset="0"/>
               </a:rPr>
-              <a:t>covariates and/or factors </a:t>
-            </a:r>
-          </a:p>
-          <a:p>
-            <a:pPr marR="0" lvl="0">
-              <a:buSzPct val="100000"/>
-              <a:tabLst>
-                <a:tab pos="457200" algn="l"/>
-              </a:tabLst>
-            </a:pPr>
+              <a:t>In the paper ripping task: 31 birds were censored</a:t>
+            </a:r>
+          </a:p>
+          <a:p>
             <a:r>
               <a:rPr lang="en-US" sz="2400" dirty="0">
-                <a:effectLst/>
                 <a:latin typeface="Corbel" panose="020B0503020204020204" pitchFamily="34" charset="0"/>
-                <a:ea typeface="Times New Roman" panose="02020603050405020304" pitchFamily="18" charset="0"/>
               </a:rPr>
-              <a:t>What were the experimental/observational units? 2 experiments measured in seconds</a:t>
-            </a:r>
-          </a:p>
-          <a:p>
-            <a:pPr marR="0" lvl="0">
-              <a:buSzPct val="100000"/>
-              <a:tabLst>
-                <a:tab pos="457200" algn="l"/>
-              </a:tabLst>
-            </a:pPr>
+              <a:t>We are dealing with a low sample size</a:t>
+            </a:r>
+          </a:p>
+          <a:p>
             <a:r>
               <a:rPr lang="en-US" sz="2400" dirty="0">
-                <a:effectLst/>
                 <a:latin typeface="Corbel" panose="020B0503020204020204" pitchFamily="34" charset="0"/>
-                <a:ea typeface="Times New Roman" panose="02020603050405020304" pitchFamily="18" charset="0"/>
               </a:rPr>
-              <a:t>What was the sample size? 70 birds total</a:t>
+              <a:t>Omitted persistency?</a:t>
             </a:r>
           </a:p>
         </p:txBody>
@@ -17850,7 +20093,7 @@
     </p:spTree>
     <p:extLst>
       <p:ext uri="{BB962C8B-B14F-4D97-AF65-F5344CB8AC3E}">
-        <p14:creationId xmlns:p14="http://schemas.microsoft.com/office/powerpoint/2010/main" val="3107468609"/>
+        <p14:creationId xmlns:p14="http://schemas.microsoft.com/office/powerpoint/2010/main" val="2111487667"/>
       </p:ext>
     </p:extLst>
   </p:cSld>
@@ -17861,6 +20104,201 @@
 </file>
 
 <file path=ppt/slides/slide7.xml><?xml version="1.0" encoding="utf-8"?>
+<p:sld xmlns:a="http://schemas.openxmlformats.org/drawingml/2006/main" xmlns:r="http://schemas.openxmlformats.org/officeDocument/2006/relationships" xmlns:p="http://schemas.openxmlformats.org/presentationml/2006/main">
+  <p:cSld>
+    <p:bg>
+      <p:bgPr>
+        <a:solidFill>
+          <a:srgbClr val="D2B48C"/>
+        </a:solidFill>
+        <a:effectLst/>
+      </p:bgPr>
+    </p:bg>
+    <p:spTree>
+      <p:nvGrpSpPr>
+        <p:cNvPr id="1" name=""/>
+        <p:cNvGrpSpPr/>
+        <p:nvPr/>
+      </p:nvGrpSpPr>
+      <p:grpSpPr>
+        <a:xfrm>
+          <a:off x="0" y="0"/>
+          <a:ext cx="0" cy="0"/>
+          <a:chOff x="0" y="0"/>
+          <a:chExt cx="0" cy="0"/>
+        </a:xfrm>
+      </p:grpSpPr>
+      <p:sp>
+        <p:nvSpPr>
+          <p:cNvPr id="2" name="Title 1">
+            <a:extLst>
+              <a:ext uri="{FF2B5EF4-FFF2-40B4-BE49-F238E27FC236}">
+                <a16:creationId xmlns:a16="http://schemas.microsoft.com/office/drawing/2014/main" id="{D9197732-5287-64EE-B5C3-31790AED66D7}"/>
+              </a:ext>
+            </a:extLst>
+          </p:cNvPr>
+          <p:cNvSpPr>
+            <a:spLocks noGrp="1"/>
+          </p:cNvSpPr>
+          <p:nvPr>
+            <p:ph type="title"/>
+          </p:nvPr>
+        </p:nvSpPr>
+        <p:spPr/>
+        <p:txBody>
+          <a:bodyPr/>
+          <a:lstStyle/>
+          <a:p>
+            <a:r>
+              <a:rPr lang="en-US" dirty="0"/>
+              <a:t>Data and Methodology</a:t>
+            </a:r>
+          </a:p>
+        </p:txBody>
+      </p:sp>
+      <p:sp>
+        <p:nvSpPr>
+          <p:cNvPr id="8" name="Content Placeholder 7">
+            <a:extLst>
+              <a:ext uri="{FF2B5EF4-FFF2-40B4-BE49-F238E27FC236}">
+                <a16:creationId xmlns:a16="http://schemas.microsoft.com/office/drawing/2014/main" id="{4589CA36-D572-DD9C-6AD2-AB279FD3E04C}"/>
+              </a:ext>
+            </a:extLst>
+          </p:cNvPr>
+          <p:cNvSpPr>
+            <a:spLocks noGrp="1"/>
+          </p:cNvSpPr>
+          <p:nvPr>
+            <p:ph idx="1"/>
+          </p:nvPr>
+        </p:nvSpPr>
+        <p:spPr/>
+        <p:txBody>
+          <a:bodyPr>
+            <a:normAutofit/>
+          </a:bodyPr>
+          <a:lstStyle/>
+          <a:p>
+            <a:r>
+              <a:rPr lang="en-US" sz="2400" dirty="0">
+                <a:latin typeface="Corbel" panose="020B0503020204020204" pitchFamily="34" charset="0"/>
+              </a:rPr>
+              <a:t>2 trials: lever and paper, here’s what they were tested on…</a:t>
+            </a:r>
+            <a:r>
+              <a:rPr lang="en-US" sz="2400" dirty="0">
+                <a:effectLst/>
+                <a:latin typeface="Corbel" panose="020B0503020204020204" pitchFamily="34" charset="0"/>
+                <a:ea typeface="Calibri" panose="020F0502020204030204" pitchFamily="34" charset="0"/>
+                <a:cs typeface="Times New Roman" panose="02020603050405020304" pitchFamily="18" charset="0"/>
+              </a:rPr>
+              <a:t> lever pulling, paper ripping, and persistence &amp; repeatability) </a:t>
+            </a:r>
+          </a:p>
+          <a:p>
+            <a:r>
+              <a:rPr lang="en-US" sz="2400" dirty="0">
+                <a:solidFill>
+                  <a:srgbClr val="000000"/>
+                </a:solidFill>
+                <a:effectLst/>
+                <a:latin typeface="Corbel" panose="020B0503020204020204" pitchFamily="34" charset="0"/>
+              </a:rPr>
+              <a:t>The </a:t>
+            </a:r>
+            <a:r>
+              <a:rPr lang="en-US" sz="2400" b="1" dirty="0">
+                <a:solidFill>
+                  <a:srgbClr val="000000"/>
+                </a:solidFill>
+                <a:effectLst/>
+                <a:latin typeface="Corbel" panose="020B0503020204020204" pitchFamily="34" charset="0"/>
+              </a:rPr>
+              <a:t>lever-pulling task </a:t>
+            </a:r>
+            <a:r>
+              <a:rPr lang="en-US" sz="2400" dirty="0">
+                <a:solidFill>
+                  <a:srgbClr val="000000"/>
+                </a:solidFill>
+                <a:effectLst/>
+                <a:latin typeface="Corbel" panose="020B0503020204020204" pitchFamily="34" charset="0"/>
+              </a:rPr>
+              <a:t>consisted of a small Perspex tube in which two wax worms were held on top of a platform supported by a lever</a:t>
+            </a:r>
+          </a:p>
+          <a:p>
+            <a:r>
+              <a:rPr lang="en-US" sz="2400" dirty="0">
+                <a:solidFill>
+                  <a:srgbClr val="000000"/>
+                </a:solidFill>
+                <a:effectLst/>
+                <a:latin typeface="Corbel" panose="020B0503020204020204" pitchFamily="34" charset="0"/>
+              </a:rPr>
+              <a:t>Birds were required to pull the lever completely out of the tube, causing the food reward to fall out. (measured in seconds)</a:t>
+            </a:r>
+          </a:p>
+          <a:p>
+            <a:r>
+              <a:rPr lang="en-US" sz="2400" dirty="0">
+                <a:solidFill>
+                  <a:srgbClr val="000000"/>
+                </a:solidFill>
+                <a:effectLst/>
+                <a:latin typeface="Corbel" panose="020B0503020204020204" pitchFamily="34" charset="0"/>
+              </a:rPr>
+              <a:t>The </a:t>
+            </a:r>
+            <a:r>
+              <a:rPr lang="en-US" sz="2400" b="1" dirty="0">
+                <a:solidFill>
+                  <a:srgbClr val="000000"/>
+                </a:solidFill>
+                <a:effectLst/>
+                <a:latin typeface="Corbel" panose="020B0503020204020204" pitchFamily="34" charset="0"/>
+              </a:rPr>
+              <a:t>paper-ripping task </a:t>
+            </a:r>
+            <a:r>
+              <a:rPr lang="en-US" sz="2400" dirty="0">
+                <a:solidFill>
+                  <a:srgbClr val="000000"/>
+                </a:solidFill>
+                <a:effectLst/>
+                <a:latin typeface="Corbel" panose="020B0503020204020204" pitchFamily="34" charset="0"/>
+              </a:rPr>
+              <a:t>consisted of the bottom half of a Petri dish, containing seeds and mealworms, wrapped with white paper towel</a:t>
+            </a:r>
+          </a:p>
+          <a:p>
+            <a:r>
+              <a:rPr lang="en-US" sz="2400" dirty="0">
+                <a:solidFill>
+                  <a:srgbClr val="000000"/>
+                </a:solidFill>
+                <a:effectLst/>
+                <a:latin typeface="Corbel" panose="020B0503020204020204" pitchFamily="34" charset="0"/>
+              </a:rPr>
+              <a:t>This task was solved when a bird ripped a hole through the paper that was big enough to extract a seed or worm. (measured in seconds)</a:t>
+            </a:r>
+          </a:p>
+        </p:txBody>
+      </p:sp>
+    </p:spTree>
+    <p:extLst>
+      <p:ext uri="{BB962C8B-B14F-4D97-AF65-F5344CB8AC3E}">
+        <p14:creationId xmlns:p14="http://schemas.microsoft.com/office/powerpoint/2010/main" val="1040092609"/>
+      </p:ext>
+    </p:extLst>
+  </p:cSld>
+  <p:clrMapOvr>
+    <a:masterClrMapping/>
+  </p:clrMapOvr>
+</p:sld>
+</file>
+
+<file path=ppt/slides/slide8.xml><?xml version="1.0" encoding="utf-8"?>
 <p:sld xmlns:a="http://schemas.openxmlformats.org/drawingml/2006/main" xmlns:r="http://schemas.openxmlformats.org/officeDocument/2006/relationships" xmlns:p="http://schemas.openxmlformats.org/presentationml/2006/main">
   <p:cSld>
     <p:bg>
@@ -17976,97 +20414,6 @@
 </p:sld>
 </file>
 
-<file path=ppt/slides/slide8.xml><?xml version="1.0" encoding="utf-8"?>
-<p:sld xmlns:a="http://schemas.openxmlformats.org/drawingml/2006/main" xmlns:r="http://schemas.openxmlformats.org/officeDocument/2006/relationships" xmlns:p="http://schemas.openxmlformats.org/presentationml/2006/main">
-  <p:cSld>
-    <p:bg>
-      <p:bgPr>
-        <a:solidFill>
-          <a:srgbClr val="D2B48C"/>
-        </a:solidFill>
-        <a:effectLst/>
-      </p:bgPr>
-    </p:bg>
-    <p:spTree>
-      <p:nvGrpSpPr>
-        <p:cNvPr id="1" name=""/>
-        <p:cNvGrpSpPr/>
-        <p:nvPr/>
-      </p:nvGrpSpPr>
-      <p:grpSpPr>
-        <a:xfrm>
-          <a:off x="0" y="0"/>
-          <a:ext cx="0" cy="0"/>
-          <a:chOff x="0" y="0"/>
-          <a:chExt cx="0" cy="0"/>
-        </a:xfrm>
-      </p:grpSpPr>
-      <p:sp>
-        <p:nvSpPr>
-          <p:cNvPr id="2" name="Title 1">
-            <a:extLst>
-              <a:ext uri="{FF2B5EF4-FFF2-40B4-BE49-F238E27FC236}">
-                <a16:creationId xmlns:a16="http://schemas.microsoft.com/office/drawing/2014/main" id="{D9197732-5287-64EE-B5C3-31790AED66D7}"/>
-              </a:ext>
-            </a:extLst>
-          </p:cNvPr>
-          <p:cNvSpPr>
-            <a:spLocks noGrp="1"/>
-          </p:cNvSpPr>
-          <p:nvPr>
-            <p:ph type="title"/>
-          </p:nvPr>
-        </p:nvSpPr>
-        <p:spPr/>
-        <p:txBody>
-          <a:bodyPr/>
-          <a:lstStyle/>
-          <a:p>
-            <a:r>
-              <a:rPr lang="en-US" dirty="0"/>
-              <a:t>Results/Analysis</a:t>
-            </a:r>
-          </a:p>
-        </p:txBody>
-      </p:sp>
-      <p:sp>
-        <p:nvSpPr>
-          <p:cNvPr id="8" name="Content Placeholder 7">
-            <a:extLst>
-              <a:ext uri="{FF2B5EF4-FFF2-40B4-BE49-F238E27FC236}">
-                <a16:creationId xmlns:a16="http://schemas.microsoft.com/office/drawing/2014/main" id="{4589CA36-D572-DD9C-6AD2-AB279FD3E04C}"/>
-              </a:ext>
-            </a:extLst>
-          </p:cNvPr>
-          <p:cNvSpPr>
-            <a:spLocks noGrp="1"/>
-          </p:cNvSpPr>
-          <p:nvPr>
-            <p:ph idx="1"/>
-          </p:nvPr>
-        </p:nvSpPr>
-        <p:spPr/>
-        <p:txBody>
-          <a:bodyPr/>
-          <a:lstStyle/>
-          <a:p>
-            <a:endParaRPr lang="en-US"/>
-          </a:p>
-        </p:txBody>
-      </p:sp>
-    </p:spTree>
-    <p:extLst>
-      <p:ext uri="{BB962C8B-B14F-4D97-AF65-F5344CB8AC3E}">
-        <p14:creationId xmlns:p14="http://schemas.microsoft.com/office/powerpoint/2010/main" val="661241979"/>
-      </p:ext>
-    </p:extLst>
-  </p:cSld>
-  <p:clrMapOvr>
-    <a:masterClrMapping/>
-  </p:clrMapOvr>
-</p:sld>
-</file>
-
 <file path=ppt/slides/slide9.xml><?xml version="1.0" encoding="utf-8"?>
 <p:sld xmlns:a="http://schemas.openxmlformats.org/drawingml/2006/main" xmlns:r="http://schemas.openxmlformats.org/officeDocument/2006/relationships" xmlns:p="http://schemas.openxmlformats.org/presentationml/2006/main">
   <p:cSld>
@@ -18115,40 +20462,79 @@
           <a:p>
             <a:r>
               <a:rPr lang="en-US" dirty="0"/>
-              <a:t>Results/Analysis</a:t>
+              <a:t>Data and Methodology</a:t>
             </a:r>
           </a:p>
         </p:txBody>
       </p:sp>
-      <p:sp>
-        <p:nvSpPr>
-          <p:cNvPr id="8" name="Content Placeholder 7">
+      <p:graphicFrame>
+        <p:nvGraphicFramePr>
+          <p:cNvPr id="3" name="Content Placeholder 2">
             <a:extLst>
               <a:ext uri="{FF2B5EF4-FFF2-40B4-BE49-F238E27FC236}">
-                <a16:creationId xmlns:a16="http://schemas.microsoft.com/office/drawing/2014/main" id="{4589CA36-D572-DD9C-6AD2-AB279FD3E04C}"/>
+                <a16:creationId xmlns:a16="http://schemas.microsoft.com/office/drawing/2014/main" id="{546904ED-F443-32E0-7C67-2E0EDDF92395}"/>
               </a:ext>
             </a:extLst>
           </p:cNvPr>
-          <p:cNvSpPr>
-            <a:spLocks noGrp="1"/>
-          </p:cNvSpPr>
+          <p:cNvGraphicFramePr>
+            <a:graphicFrameLocks noGrp="1" noChangeAspect="1"/>
+          </p:cNvGraphicFramePr>
           <p:nvPr>
             <p:ph idx="1"/>
+            <p:extLst>
+              <p:ext uri="{D42A27DB-BD31-4B8C-83A1-F6EECF244321}">
+                <p14:modId xmlns:p14="http://schemas.microsoft.com/office/powerpoint/2010/main" val="3425599519"/>
+              </p:ext>
+            </p:extLst>
           </p:nvPr>
-        </p:nvSpPr>
-        <p:spPr/>
-        <p:txBody>
-          <a:bodyPr/>
-          <a:lstStyle/>
-          <a:p>
-            <a:endParaRPr lang="en-US"/>
-          </a:p>
-        </p:txBody>
-      </p:sp>
+        </p:nvGraphicFramePr>
+        <p:xfrm>
+          <a:off x="0" y="1688542"/>
+          <a:ext cx="13449519" cy="3480916"/>
+        </p:xfrm>
+        <a:graphic>
+          <a:graphicData uri="http://schemas.openxmlformats.org/presentationml/2006/ole">
+            <mc:AlternateContent xmlns:mc="http://schemas.openxmlformats.org/markup-compatibility/2006">
+              <mc:Choice xmlns:v="urn:schemas-microsoft-com:vml" Requires="v">
+                <p:oleObj name="Worksheet" r:id="rId2" imgW="14770100" imgH="3822700" progId="Excel.Sheet.12">
+                  <p:embed/>
+                </p:oleObj>
+              </mc:Choice>
+              <mc:Fallback>
+                <p:oleObj name="Worksheet" r:id="rId2" imgW="14770100" imgH="3822700" progId="Excel.Sheet.12">
+                  <p:embed/>
+                  <p:pic>
+                    <p:nvPicPr>
+                      <p:cNvPr id="0" name=""/>
+                      <p:cNvPicPr/>
+                      <p:nvPr/>
+                    </p:nvPicPr>
+                    <p:blipFill>
+                      <a:blip r:embed="rId3"/>
+                      <a:stretch>
+                        <a:fillRect/>
+                      </a:stretch>
+                    </p:blipFill>
+                    <p:spPr>
+                      <a:xfrm>
+                        <a:off x="0" y="1688542"/>
+                        <a:ext cx="13449519" cy="3480916"/>
+                      </a:xfrm>
+                      <a:prstGeom prst="rect">
+                        <a:avLst/>
+                      </a:prstGeom>
+                    </p:spPr>
+                  </p:pic>
+                </p:oleObj>
+              </mc:Fallback>
+            </mc:AlternateContent>
+          </a:graphicData>
+        </a:graphic>
+      </p:graphicFrame>
     </p:spTree>
     <p:extLst>
       <p:ext uri="{BB962C8B-B14F-4D97-AF65-F5344CB8AC3E}">
-        <p14:creationId xmlns:p14="http://schemas.microsoft.com/office/powerpoint/2010/main" val="3078242495"/>
+        <p14:creationId xmlns:p14="http://schemas.microsoft.com/office/powerpoint/2010/main" val="2328701243"/>
       </p:ext>
     </p:extLst>
   </p:cSld>

</xml_diff>